<commit_message>
added updated mobilerobot-legend.pptx for simplified problem
</commit_message>
<xml_diff>
--- a/XPlanningEvaluation/data/legend/mobilerobot-legend.pptx
+++ b/XPlanningEvaluation/data/legend/mobilerobot-legend.pptx
@@ -6,6 +6,7 @@
   </p:sldMasterIdLst>
   <p:sldIdLst>
     <p:sldId id="257" r:id="rId2"/>
+    <p:sldId id="258" r:id="rId3"/>
   </p:sldIdLst>
   <p:sldSz cx="8020050" cy="28601988"/>
   <p:notesSz cx="6858000" cy="9144000"/>
@@ -243,7 +244,7 @@
           <a:p>
             <a:fld id="{117BC45A-752C-174D-BFB4-5EE0276A99CB}" type="datetimeFigureOut">
               <a:rPr lang="en-US" smtClean="0"/>
-              <a:t>7/2/19</a:t>
+              <a:t>8/21/19</a:t>
             </a:fld>
             <a:endParaRPr lang="en-US"/>
           </a:p>
@@ -413,7 +414,7 @@
           <a:p>
             <a:fld id="{117BC45A-752C-174D-BFB4-5EE0276A99CB}" type="datetimeFigureOut">
               <a:rPr lang="en-US" smtClean="0"/>
-              <a:t>7/2/19</a:t>
+              <a:t>8/21/19</a:t>
             </a:fld>
             <a:endParaRPr lang="en-US"/>
           </a:p>
@@ -593,7 +594,7 @@
           <a:p>
             <a:fld id="{117BC45A-752C-174D-BFB4-5EE0276A99CB}" type="datetimeFigureOut">
               <a:rPr lang="en-US" smtClean="0"/>
-              <a:t>7/2/19</a:t>
+              <a:t>8/21/19</a:t>
             </a:fld>
             <a:endParaRPr lang="en-US"/>
           </a:p>
@@ -763,7 +764,7 @@
           <a:p>
             <a:fld id="{117BC45A-752C-174D-BFB4-5EE0276A99CB}" type="datetimeFigureOut">
               <a:rPr lang="en-US" smtClean="0"/>
-              <a:t>7/2/19</a:t>
+              <a:t>8/21/19</a:t>
             </a:fld>
             <a:endParaRPr lang="en-US"/>
           </a:p>
@@ -1007,7 +1008,7 @@
           <a:p>
             <a:fld id="{117BC45A-752C-174D-BFB4-5EE0276A99CB}" type="datetimeFigureOut">
               <a:rPr lang="en-US" smtClean="0"/>
-              <a:t>7/2/19</a:t>
+              <a:t>8/21/19</a:t>
             </a:fld>
             <a:endParaRPr lang="en-US"/>
           </a:p>
@@ -1239,7 +1240,7 @@
           <a:p>
             <a:fld id="{117BC45A-752C-174D-BFB4-5EE0276A99CB}" type="datetimeFigureOut">
               <a:rPr lang="en-US" smtClean="0"/>
-              <a:t>7/2/19</a:t>
+              <a:t>8/21/19</a:t>
             </a:fld>
             <a:endParaRPr lang="en-US"/>
           </a:p>
@@ -1606,7 +1607,7 @@
           <a:p>
             <a:fld id="{117BC45A-752C-174D-BFB4-5EE0276A99CB}" type="datetimeFigureOut">
               <a:rPr lang="en-US" smtClean="0"/>
-              <a:t>7/2/19</a:t>
+              <a:t>8/21/19</a:t>
             </a:fld>
             <a:endParaRPr lang="en-US"/>
           </a:p>
@@ -1724,7 +1725,7 @@
           <a:p>
             <a:fld id="{117BC45A-752C-174D-BFB4-5EE0276A99CB}" type="datetimeFigureOut">
               <a:rPr lang="en-US" smtClean="0"/>
-              <a:t>7/2/19</a:t>
+              <a:t>8/21/19</a:t>
             </a:fld>
             <a:endParaRPr lang="en-US"/>
           </a:p>
@@ -1819,7 +1820,7 @@
           <a:p>
             <a:fld id="{117BC45A-752C-174D-BFB4-5EE0276A99CB}" type="datetimeFigureOut">
               <a:rPr lang="en-US" smtClean="0"/>
-              <a:t>7/2/19</a:t>
+              <a:t>8/21/19</a:t>
             </a:fld>
             <a:endParaRPr lang="en-US"/>
           </a:p>
@@ -2096,7 +2097,7 @@
           <a:p>
             <a:fld id="{117BC45A-752C-174D-BFB4-5EE0276A99CB}" type="datetimeFigureOut">
               <a:rPr lang="en-US" smtClean="0"/>
-              <a:t>7/2/19</a:t>
+              <a:t>8/21/19</a:t>
             </a:fld>
             <a:endParaRPr lang="en-US"/>
           </a:p>
@@ -2353,7 +2354,7 @@
           <a:p>
             <a:fld id="{117BC45A-752C-174D-BFB4-5EE0276A99CB}" type="datetimeFigureOut">
               <a:rPr lang="en-US" smtClean="0"/>
-              <a:t>7/2/19</a:t>
+              <a:t>8/21/19</a:t>
             </a:fld>
             <a:endParaRPr lang="en-US"/>
           </a:p>
@@ -2566,7 +2567,7 @@
           <a:p>
             <a:fld id="{117BC45A-752C-174D-BFB4-5EE0276A99CB}" type="datetimeFigureOut">
               <a:rPr lang="en-US" smtClean="0"/>
-              <a:t>7/2/19</a:t>
+              <a:t>8/21/19</a:t>
             </a:fld>
             <a:endParaRPr lang="en-US"/>
           </a:p>
@@ -6016,6 +6017,2611 @@
 </p:sld>
 </file>
 
+<file path=ppt/slides/slide2.xml><?xml version="1.0" encoding="utf-8"?>
+<p:sld xmlns:a="http://schemas.openxmlformats.org/drawingml/2006/main" xmlns:r="http://schemas.openxmlformats.org/officeDocument/2006/relationships" xmlns:p="http://schemas.openxmlformats.org/presentationml/2006/main">
+  <p:cSld>
+    <p:spTree>
+      <p:nvGrpSpPr>
+        <p:cNvPr id="1" name=""/>
+        <p:cNvGrpSpPr/>
+        <p:nvPr/>
+      </p:nvGrpSpPr>
+      <p:grpSpPr>
+        <a:xfrm>
+          <a:off x="0" y="0"/>
+          <a:ext cx="0" cy="0"/>
+          <a:chOff x="0" y="0"/>
+          <a:chExt cx="0" cy="0"/>
+        </a:xfrm>
+      </p:grpSpPr>
+      <p:sp>
+        <p:nvSpPr>
+          <p:cNvPr id="2" name="Rectangle 1">
+            <a:extLst>
+              <a:ext uri="{FF2B5EF4-FFF2-40B4-BE49-F238E27FC236}">
+                <a16:creationId xmlns:a16="http://schemas.microsoft.com/office/drawing/2014/main" id="{6EED9CB1-7F06-B449-A251-E7A54B0A4480}"/>
+              </a:ext>
+            </a:extLst>
+          </p:cNvPr>
+          <p:cNvSpPr/>
+          <p:nvPr/>
+        </p:nvSpPr>
+        <p:spPr>
+          <a:xfrm>
+            <a:off x="8211" y="13679369"/>
+            <a:ext cx="8001000" cy="14923980"/>
+          </a:xfrm>
+          <a:prstGeom prst="rect">
+            <a:avLst/>
+          </a:prstGeom>
+          <a:noFill/>
+          <a:ln w="76200">
+            <a:solidFill>
+              <a:schemeClr val="tx2"/>
+            </a:solidFill>
+          </a:ln>
+        </p:spPr>
+        <p:style>
+          <a:lnRef idx="2">
+            <a:schemeClr val="accent1">
+              <a:shade val="50000"/>
+            </a:schemeClr>
+          </a:lnRef>
+          <a:fillRef idx="1">
+            <a:schemeClr val="accent1"/>
+          </a:fillRef>
+          <a:effectRef idx="0">
+            <a:schemeClr val="accent1"/>
+          </a:effectRef>
+          <a:fontRef idx="minor">
+            <a:schemeClr val="lt1"/>
+          </a:fontRef>
+        </p:style>
+        <p:txBody>
+          <a:bodyPr rtlCol="0" anchor="ctr"/>
+          <a:lstStyle/>
+          <a:p>
+            <a:pPr algn="ctr"/>
+            <a:endParaRPr lang="en-US" sz="9783"/>
+          </a:p>
+        </p:txBody>
+      </p:sp>
+      <p:grpSp>
+        <p:nvGrpSpPr>
+          <p:cNvPr id="3" name="Group 2">
+            <a:extLst>
+              <a:ext uri="{FF2B5EF4-FFF2-40B4-BE49-F238E27FC236}">
+                <a16:creationId xmlns:a16="http://schemas.microsoft.com/office/drawing/2014/main" id="{465E60E2-12AE-AA48-A220-7700AB8BB0E0}"/>
+              </a:ext>
+            </a:extLst>
+          </p:cNvPr>
+          <p:cNvGrpSpPr/>
+          <p:nvPr/>
+        </p:nvGrpSpPr>
+        <p:grpSpPr>
+          <a:xfrm>
+            <a:off x="661428" y="1054666"/>
+            <a:ext cx="4989017" cy="2902172"/>
+            <a:chOff x="661428" y="1239157"/>
+            <a:chExt cx="4989017" cy="2902172"/>
+          </a:xfrm>
+        </p:grpSpPr>
+        <p:grpSp>
+          <p:nvGrpSpPr>
+            <p:cNvPr id="4" name="Group 3">
+              <a:extLst>
+                <a:ext uri="{FF2B5EF4-FFF2-40B4-BE49-F238E27FC236}">
+                  <a16:creationId xmlns:a16="http://schemas.microsoft.com/office/drawing/2014/main" id="{FDAA7028-CF69-4846-B72B-B94B8C219060}"/>
+                </a:ext>
+              </a:extLst>
+            </p:cNvPr>
+            <p:cNvGrpSpPr/>
+            <p:nvPr/>
+          </p:nvGrpSpPr>
+          <p:grpSpPr>
+            <a:xfrm>
+              <a:off x="661428" y="1239157"/>
+              <a:ext cx="3620181" cy="731520"/>
+              <a:chOff x="661429" y="958533"/>
+              <a:chExt cx="3620181" cy="731520"/>
+            </a:xfrm>
+          </p:grpSpPr>
+          <p:sp>
+            <p:nvSpPr>
+              <p:cNvPr id="11" name="Oval 10">
+                <a:extLst>
+                  <a:ext uri="{FF2B5EF4-FFF2-40B4-BE49-F238E27FC236}">
+                    <a16:creationId xmlns:a16="http://schemas.microsoft.com/office/drawing/2014/main" id="{E01F7E7F-076B-A644-8B63-BA7CED9064DD}"/>
+                  </a:ext>
+                </a:extLst>
+              </p:cNvPr>
+              <p:cNvSpPr>
+                <a:spLocks noChangeAspect="1"/>
+              </p:cNvSpPr>
+              <p:nvPr/>
+            </p:nvSpPr>
+            <p:spPr>
+              <a:xfrm>
+                <a:off x="661429" y="958533"/>
+                <a:ext cx="731506" cy="731520"/>
+              </a:xfrm>
+              <a:prstGeom prst="ellipse">
+                <a:avLst/>
+              </a:prstGeom>
+              <a:solidFill>
+                <a:srgbClr val="00B050"/>
+              </a:solidFill>
+              <a:ln>
+                <a:solidFill>
+                  <a:schemeClr val="tx1"/>
+                </a:solidFill>
+              </a:ln>
+            </p:spPr>
+            <p:style>
+              <a:lnRef idx="2">
+                <a:schemeClr val="accent1">
+                  <a:shade val="50000"/>
+                </a:schemeClr>
+              </a:lnRef>
+              <a:fillRef idx="1">
+                <a:schemeClr val="accent1"/>
+              </a:fillRef>
+              <a:effectRef idx="0">
+                <a:schemeClr val="accent1"/>
+              </a:effectRef>
+              <a:fontRef idx="minor">
+                <a:schemeClr val="lt1"/>
+              </a:fontRef>
+            </p:style>
+            <p:txBody>
+              <a:bodyPr rtlCol="0" anchor="ctr"/>
+              <a:lstStyle/>
+              <a:p>
+                <a:pPr algn="ctr"/>
+                <a:endParaRPr lang="en-US" sz="9783" dirty="0"/>
+              </a:p>
+            </p:txBody>
+          </p:sp>
+          <p:sp>
+            <p:nvSpPr>
+              <p:cNvPr id="12" name="TextBox 11">
+                <a:extLst>
+                  <a:ext uri="{FF2B5EF4-FFF2-40B4-BE49-F238E27FC236}">
+                    <a16:creationId xmlns:a16="http://schemas.microsoft.com/office/drawing/2014/main" id="{F907125B-B62E-1149-8788-4328CC08D9A9}"/>
+                  </a:ext>
+                </a:extLst>
+              </p:cNvPr>
+              <p:cNvSpPr txBox="1"/>
+              <p:nvPr/>
+            </p:nvSpPr>
+            <p:spPr>
+              <a:xfrm>
+                <a:off x="1758483" y="970350"/>
+                <a:ext cx="2523127" cy="707886"/>
+              </a:xfrm>
+              <a:prstGeom prst="rect">
+                <a:avLst/>
+              </a:prstGeom>
+              <a:noFill/>
+            </p:spPr>
+            <p:txBody>
+              <a:bodyPr wrap="none" rtlCol="0">
+                <a:spAutoFit/>
+              </a:bodyPr>
+              <a:lstStyle/>
+              <a:p>
+                <a:r>
+                  <a:rPr lang="en-US" sz="4000" dirty="0"/>
+                  <a:t>Public Area</a:t>
+                </a:r>
+              </a:p>
+            </p:txBody>
+          </p:sp>
+        </p:grpSp>
+        <p:grpSp>
+          <p:nvGrpSpPr>
+            <p:cNvPr id="5" name="Group 4">
+              <a:extLst>
+                <a:ext uri="{FF2B5EF4-FFF2-40B4-BE49-F238E27FC236}">
+                  <a16:creationId xmlns:a16="http://schemas.microsoft.com/office/drawing/2014/main" id="{70DE7DB6-607E-E649-BC36-C604518D2C6C}"/>
+                </a:ext>
+              </a:extLst>
+            </p:cNvPr>
+            <p:cNvGrpSpPr/>
+            <p:nvPr/>
+          </p:nvGrpSpPr>
+          <p:grpSpPr>
+            <a:xfrm>
+              <a:off x="661429" y="2324483"/>
+              <a:ext cx="4989016" cy="731520"/>
+              <a:chOff x="661429" y="2166735"/>
+              <a:chExt cx="4989016" cy="731520"/>
+            </a:xfrm>
+          </p:grpSpPr>
+          <p:sp>
+            <p:nvSpPr>
+              <p:cNvPr id="9" name="Oval 8">
+                <a:extLst>
+                  <a:ext uri="{FF2B5EF4-FFF2-40B4-BE49-F238E27FC236}">
+                    <a16:creationId xmlns:a16="http://schemas.microsoft.com/office/drawing/2014/main" id="{FAD30923-9673-C94F-A81A-1FF40F46F9A1}"/>
+                  </a:ext>
+                </a:extLst>
+              </p:cNvPr>
+              <p:cNvSpPr>
+                <a:spLocks noChangeAspect="1"/>
+              </p:cNvSpPr>
+              <p:nvPr/>
+            </p:nvSpPr>
+            <p:spPr>
+              <a:xfrm>
+                <a:off x="661429" y="2166735"/>
+                <a:ext cx="731520" cy="731520"/>
+              </a:xfrm>
+              <a:prstGeom prst="ellipse">
+                <a:avLst/>
+              </a:prstGeom>
+              <a:solidFill>
+                <a:srgbClr val="FFFF00"/>
+              </a:solidFill>
+              <a:ln>
+                <a:solidFill>
+                  <a:schemeClr val="tx1"/>
+                </a:solidFill>
+              </a:ln>
+            </p:spPr>
+            <p:style>
+              <a:lnRef idx="2">
+                <a:schemeClr val="accent1">
+                  <a:shade val="50000"/>
+                </a:schemeClr>
+              </a:lnRef>
+              <a:fillRef idx="1">
+                <a:schemeClr val="accent1"/>
+              </a:fillRef>
+              <a:effectRef idx="0">
+                <a:schemeClr val="accent1"/>
+              </a:effectRef>
+              <a:fontRef idx="minor">
+                <a:schemeClr val="lt1"/>
+              </a:fontRef>
+            </p:style>
+            <p:txBody>
+              <a:bodyPr rtlCol="0" anchor="ctr"/>
+              <a:lstStyle/>
+              <a:p>
+                <a:pPr algn="ctr"/>
+                <a:endParaRPr lang="en-US" sz="9783"/>
+              </a:p>
+            </p:txBody>
+          </p:sp>
+          <p:sp>
+            <p:nvSpPr>
+              <p:cNvPr id="10" name="TextBox 9">
+                <a:extLst>
+                  <a:ext uri="{FF2B5EF4-FFF2-40B4-BE49-F238E27FC236}">
+                    <a16:creationId xmlns:a16="http://schemas.microsoft.com/office/drawing/2014/main" id="{92107F56-CB54-F649-9DDF-D5B892E337C2}"/>
+                  </a:ext>
+                </a:extLst>
+              </p:cNvPr>
+              <p:cNvSpPr txBox="1"/>
+              <p:nvPr/>
+            </p:nvSpPr>
+            <p:spPr>
+              <a:xfrm>
+                <a:off x="1758482" y="2178552"/>
+                <a:ext cx="3891963" cy="707886"/>
+              </a:xfrm>
+              <a:prstGeom prst="rect">
+                <a:avLst/>
+              </a:prstGeom>
+              <a:noFill/>
+            </p:spPr>
+            <p:txBody>
+              <a:bodyPr wrap="none" rtlCol="0">
+                <a:spAutoFit/>
+              </a:bodyPr>
+              <a:lstStyle/>
+              <a:p>
+                <a:r>
+                  <a:rPr lang="en-US" sz="4000" dirty="0"/>
+                  <a:t>Semi-Private Area</a:t>
+                </a:r>
+              </a:p>
+            </p:txBody>
+          </p:sp>
+        </p:grpSp>
+        <p:grpSp>
+          <p:nvGrpSpPr>
+            <p:cNvPr id="6" name="Group 5">
+              <a:extLst>
+                <a:ext uri="{FF2B5EF4-FFF2-40B4-BE49-F238E27FC236}">
+                  <a16:creationId xmlns:a16="http://schemas.microsoft.com/office/drawing/2014/main" id="{A82EE53B-2BE7-CD41-9429-E20176B16F41}"/>
+                </a:ext>
+              </a:extLst>
+            </p:cNvPr>
+            <p:cNvGrpSpPr/>
+            <p:nvPr/>
+          </p:nvGrpSpPr>
+          <p:grpSpPr>
+            <a:xfrm>
+              <a:off x="661428" y="3409809"/>
+              <a:ext cx="3814016" cy="731520"/>
+              <a:chOff x="661428" y="3269591"/>
+              <a:chExt cx="3814016" cy="731520"/>
+            </a:xfrm>
+          </p:grpSpPr>
+          <p:sp>
+            <p:nvSpPr>
+              <p:cNvPr id="7" name="Oval 6">
+                <a:extLst>
+                  <a:ext uri="{FF2B5EF4-FFF2-40B4-BE49-F238E27FC236}">
+                    <a16:creationId xmlns:a16="http://schemas.microsoft.com/office/drawing/2014/main" id="{75D9631F-24D2-E148-90BF-1D54E44431AD}"/>
+                  </a:ext>
+                </a:extLst>
+              </p:cNvPr>
+              <p:cNvSpPr>
+                <a:spLocks noChangeAspect="1"/>
+              </p:cNvSpPr>
+              <p:nvPr/>
+            </p:nvSpPr>
+            <p:spPr>
+              <a:xfrm>
+                <a:off x="661428" y="3269591"/>
+                <a:ext cx="731513" cy="731520"/>
+              </a:xfrm>
+              <a:prstGeom prst="ellipse">
+                <a:avLst/>
+              </a:prstGeom>
+              <a:solidFill>
+                <a:srgbClr val="FF0000"/>
+              </a:solidFill>
+              <a:ln>
+                <a:solidFill>
+                  <a:schemeClr val="tx1"/>
+                </a:solidFill>
+              </a:ln>
+            </p:spPr>
+            <p:style>
+              <a:lnRef idx="2">
+                <a:schemeClr val="accent1">
+                  <a:shade val="50000"/>
+                </a:schemeClr>
+              </a:lnRef>
+              <a:fillRef idx="1">
+                <a:schemeClr val="accent1"/>
+              </a:fillRef>
+              <a:effectRef idx="0">
+                <a:schemeClr val="accent1"/>
+              </a:effectRef>
+              <a:fontRef idx="minor">
+                <a:schemeClr val="lt1"/>
+              </a:fontRef>
+            </p:style>
+            <p:txBody>
+              <a:bodyPr rtlCol="0" anchor="ctr"/>
+              <a:lstStyle/>
+              <a:p>
+                <a:pPr algn="ctr"/>
+                <a:endParaRPr lang="en-US" sz="9783"/>
+              </a:p>
+            </p:txBody>
+          </p:sp>
+          <p:sp>
+            <p:nvSpPr>
+              <p:cNvPr id="8" name="TextBox 7">
+                <a:extLst>
+                  <a:ext uri="{FF2B5EF4-FFF2-40B4-BE49-F238E27FC236}">
+                    <a16:creationId xmlns:a16="http://schemas.microsoft.com/office/drawing/2014/main" id="{C1461940-5499-EF41-80BF-C686DD88264C}"/>
+                  </a:ext>
+                </a:extLst>
+              </p:cNvPr>
+              <p:cNvSpPr txBox="1"/>
+              <p:nvPr/>
+            </p:nvSpPr>
+            <p:spPr>
+              <a:xfrm>
+                <a:off x="1758482" y="3281408"/>
+                <a:ext cx="2716962" cy="707886"/>
+              </a:xfrm>
+              <a:prstGeom prst="rect">
+                <a:avLst/>
+              </a:prstGeom>
+              <a:noFill/>
+            </p:spPr>
+            <p:txBody>
+              <a:bodyPr wrap="none" rtlCol="0">
+                <a:spAutoFit/>
+              </a:bodyPr>
+              <a:lstStyle/>
+              <a:p>
+                <a:r>
+                  <a:rPr lang="en-US" sz="4000" dirty="0"/>
+                  <a:t>Private Area</a:t>
+                </a:r>
+              </a:p>
+            </p:txBody>
+          </p:sp>
+        </p:grpSp>
+      </p:grpSp>
+      <p:grpSp>
+        <p:nvGrpSpPr>
+          <p:cNvPr id="78" name="Group 77">
+            <a:extLst>
+              <a:ext uri="{FF2B5EF4-FFF2-40B4-BE49-F238E27FC236}">
+                <a16:creationId xmlns:a16="http://schemas.microsoft.com/office/drawing/2014/main" id="{7706F1E0-8435-0043-A350-7F811DAFE5A9}"/>
+              </a:ext>
+            </a:extLst>
+          </p:cNvPr>
+          <p:cNvGrpSpPr/>
+          <p:nvPr/>
+        </p:nvGrpSpPr>
+        <p:grpSpPr>
+          <a:xfrm>
+            <a:off x="403017" y="4592906"/>
+            <a:ext cx="6512847" cy="2057809"/>
+            <a:chOff x="403017" y="4480641"/>
+            <a:chExt cx="6512847" cy="2057809"/>
+          </a:xfrm>
+        </p:grpSpPr>
+        <p:grpSp>
+          <p:nvGrpSpPr>
+            <p:cNvPr id="14" name="Group 13">
+              <a:extLst>
+                <a:ext uri="{FF2B5EF4-FFF2-40B4-BE49-F238E27FC236}">
+                  <a16:creationId xmlns:a16="http://schemas.microsoft.com/office/drawing/2014/main" id="{B0A73490-7A63-214B-9963-653BDB0FB661}"/>
+                </a:ext>
+              </a:extLst>
+            </p:cNvPr>
+            <p:cNvGrpSpPr/>
+            <p:nvPr/>
+          </p:nvGrpSpPr>
+          <p:grpSpPr>
+            <a:xfrm>
+              <a:off x="403023" y="4480641"/>
+              <a:ext cx="6487187" cy="707886"/>
+              <a:chOff x="403023" y="5813143"/>
+              <a:chExt cx="6487187" cy="707886"/>
+            </a:xfrm>
+          </p:grpSpPr>
+          <p:grpSp>
+            <p:nvGrpSpPr>
+              <p:cNvPr id="20" name="Group 19">
+                <a:extLst>
+                  <a:ext uri="{FF2B5EF4-FFF2-40B4-BE49-F238E27FC236}">
+                    <a16:creationId xmlns:a16="http://schemas.microsoft.com/office/drawing/2014/main" id="{24431A3B-F2CC-494F-B4AC-A8C9A0253BD2}"/>
+                  </a:ext>
+                </a:extLst>
+              </p:cNvPr>
+              <p:cNvGrpSpPr/>
+              <p:nvPr/>
+            </p:nvGrpSpPr>
+            <p:grpSpPr>
+              <a:xfrm>
+                <a:off x="403023" y="5813143"/>
+                <a:ext cx="2242632" cy="707886"/>
+                <a:chOff x="403023" y="5786717"/>
+                <a:chExt cx="2242632" cy="707886"/>
+              </a:xfrm>
+            </p:grpSpPr>
+            <p:sp>
+              <p:nvSpPr>
+                <p:cNvPr id="22" name="TextBox 21">
+                  <a:extLst>
+                    <a:ext uri="{FF2B5EF4-FFF2-40B4-BE49-F238E27FC236}">
+                      <a16:creationId xmlns:a16="http://schemas.microsoft.com/office/drawing/2014/main" id="{6B812E99-C4DD-0A49-8E1B-6DA0788A3D1E}"/>
+                    </a:ext>
+                  </a:extLst>
+                </p:cNvPr>
+                <p:cNvSpPr txBox="1"/>
+                <p:nvPr/>
+              </p:nvSpPr>
+              <p:spPr>
+                <a:xfrm>
+                  <a:off x="1129840" y="5786717"/>
+                  <a:ext cx="760144" cy="707886"/>
+                </a:xfrm>
+                <a:prstGeom prst="rect">
+                  <a:avLst/>
+                </a:prstGeom>
+                <a:noFill/>
+              </p:spPr>
+              <p:txBody>
+                <a:bodyPr wrap="none" rtlCol="0">
+                  <a:spAutoFit/>
+                </a:bodyPr>
+                <a:lstStyle/>
+                <a:p>
+                  <a:r>
+                    <a:rPr lang="en-US" sz="4000" dirty="0"/>
+                    <a:t>SO</a:t>
+                  </a:r>
+                </a:p>
+              </p:txBody>
+            </p:sp>
+            <p:cxnSp>
+              <p:nvCxnSpPr>
+                <p:cNvPr id="23" name="Straight Connector 22">
+                  <a:extLst>
+                    <a:ext uri="{FF2B5EF4-FFF2-40B4-BE49-F238E27FC236}">
+                      <a16:creationId xmlns:a16="http://schemas.microsoft.com/office/drawing/2014/main" id="{905FC67B-F8AE-BF44-86ED-97AEF21B3023}"/>
+                    </a:ext>
+                  </a:extLst>
+                </p:cNvPr>
+                <p:cNvCxnSpPr>
+                  <a:cxnSpLocks/>
+                </p:cNvCxnSpPr>
+                <p:nvPr/>
+              </p:nvCxnSpPr>
+              <p:spPr>
+                <a:xfrm>
+                  <a:off x="403023" y="6494602"/>
+                  <a:ext cx="2242632" cy="0"/>
+                </a:xfrm>
+                <a:prstGeom prst="line">
+                  <a:avLst/>
+                </a:prstGeom>
+                <a:ln w="57150">
+                  <a:solidFill>
+                    <a:schemeClr val="tx1"/>
+                  </a:solidFill>
+                </a:ln>
+              </p:spPr>
+              <p:style>
+                <a:lnRef idx="1">
+                  <a:schemeClr val="accent1"/>
+                </a:lnRef>
+                <a:fillRef idx="0">
+                  <a:schemeClr val="accent1"/>
+                </a:fillRef>
+                <a:effectRef idx="0">
+                  <a:schemeClr val="accent1"/>
+                </a:effectRef>
+                <a:fontRef idx="minor">
+                  <a:schemeClr val="tx1"/>
+                </a:fontRef>
+              </p:style>
+            </p:cxnSp>
+          </p:grpSp>
+          <p:sp>
+            <p:nvSpPr>
+              <p:cNvPr id="21" name="TextBox 20">
+                <a:extLst>
+                  <a:ext uri="{FF2B5EF4-FFF2-40B4-BE49-F238E27FC236}">
+                    <a16:creationId xmlns:a16="http://schemas.microsoft.com/office/drawing/2014/main" id="{16B85D6F-25AA-C54B-9687-8A7129F1586F}"/>
+                  </a:ext>
+                </a:extLst>
+              </p:cNvPr>
+              <p:cNvSpPr txBox="1"/>
+              <p:nvPr/>
+            </p:nvSpPr>
+            <p:spPr>
+              <a:xfrm>
+                <a:off x="3052810" y="5813143"/>
+                <a:ext cx="3837400" cy="707885"/>
+              </a:xfrm>
+              <a:prstGeom prst="rect">
+                <a:avLst/>
+              </a:prstGeom>
+              <a:noFill/>
+            </p:spPr>
+            <p:txBody>
+              <a:bodyPr wrap="square" rtlCol="0">
+                <a:spAutoFit/>
+              </a:bodyPr>
+              <a:lstStyle/>
+              <a:p>
+                <a:r>
+                  <a:rPr lang="en-US" sz="4000" dirty="0"/>
+                  <a:t>Sparse Obstacles</a:t>
+                </a:r>
+              </a:p>
+            </p:txBody>
+          </p:sp>
+        </p:grpSp>
+        <p:grpSp>
+          <p:nvGrpSpPr>
+            <p:cNvPr id="76" name="Group 75">
+              <a:extLst>
+                <a:ext uri="{FF2B5EF4-FFF2-40B4-BE49-F238E27FC236}">
+                  <a16:creationId xmlns:a16="http://schemas.microsoft.com/office/drawing/2014/main" id="{538DADBD-F590-A44D-B9E5-AB1A3A7763FB}"/>
+                </a:ext>
+              </a:extLst>
+            </p:cNvPr>
+            <p:cNvGrpSpPr/>
+            <p:nvPr/>
+          </p:nvGrpSpPr>
+          <p:grpSpPr>
+            <a:xfrm>
+              <a:off x="403017" y="5830564"/>
+              <a:ext cx="6512847" cy="707886"/>
+              <a:chOff x="403017" y="7009487"/>
+              <a:chExt cx="6512847" cy="707886"/>
+            </a:xfrm>
+          </p:grpSpPr>
+          <p:grpSp>
+            <p:nvGrpSpPr>
+              <p:cNvPr id="75" name="Group 74">
+                <a:extLst>
+                  <a:ext uri="{FF2B5EF4-FFF2-40B4-BE49-F238E27FC236}">
+                    <a16:creationId xmlns:a16="http://schemas.microsoft.com/office/drawing/2014/main" id="{12BDB75B-B98F-B540-9F30-37D72B5687B5}"/>
+                  </a:ext>
+                </a:extLst>
+              </p:cNvPr>
+              <p:cNvGrpSpPr/>
+              <p:nvPr/>
+            </p:nvGrpSpPr>
+            <p:grpSpPr>
+              <a:xfrm>
+                <a:off x="403017" y="7009487"/>
+                <a:ext cx="2242632" cy="707886"/>
+                <a:chOff x="403017" y="7009487"/>
+                <a:chExt cx="2242632" cy="707886"/>
+              </a:xfrm>
+            </p:grpSpPr>
+            <p:sp>
+              <p:nvSpPr>
+                <p:cNvPr id="18" name="TextBox 17">
+                  <a:extLst>
+                    <a:ext uri="{FF2B5EF4-FFF2-40B4-BE49-F238E27FC236}">
+                      <a16:creationId xmlns:a16="http://schemas.microsoft.com/office/drawing/2014/main" id="{B3771149-69AD-1848-B985-A3EB952B9BCA}"/>
+                    </a:ext>
+                  </a:extLst>
+                </p:cNvPr>
+                <p:cNvSpPr txBox="1"/>
+                <p:nvPr/>
+              </p:nvSpPr>
+              <p:spPr>
+                <a:xfrm>
+                  <a:off x="1104186" y="7009487"/>
+                  <a:ext cx="840295" cy="707886"/>
+                </a:xfrm>
+                <a:prstGeom prst="rect">
+                  <a:avLst/>
+                </a:prstGeom>
+                <a:noFill/>
+              </p:spPr>
+              <p:txBody>
+                <a:bodyPr wrap="none" rtlCol="0">
+                  <a:spAutoFit/>
+                </a:bodyPr>
+                <a:lstStyle/>
+                <a:p>
+                  <a:r>
+                    <a:rPr lang="en-US" sz="4000" dirty="0"/>
+                    <a:t>DO</a:t>
+                  </a:r>
+                </a:p>
+              </p:txBody>
+            </p:sp>
+            <p:cxnSp>
+              <p:nvCxnSpPr>
+                <p:cNvPr id="19" name="Straight Connector 18">
+                  <a:extLst>
+                    <a:ext uri="{FF2B5EF4-FFF2-40B4-BE49-F238E27FC236}">
+                      <a16:creationId xmlns:a16="http://schemas.microsoft.com/office/drawing/2014/main" id="{8B4914A2-DE96-A640-9189-A08008CFF4F2}"/>
+                    </a:ext>
+                  </a:extLst>
+                </p:cNvPr>
+                <p:cNvCxnSpPr>
+                  <a:cxnSpLocks/>
+                </p:cNvCxnSpPr>
+                <p:nvPr/>
+              </p:nvCxnSpPr>
+              <p:spPr>
+                <a:xfrm>
+                  <a:off x="403017" y="7717373"/>
+                  <a:ext cx="2242632" cy="0"/>
+                </a:xfrm>
+                <a:prstGeom prst="line">
+                  <a:avLst/>
+                </a:prstGeom>
+                <a:ln w="57150">
+                  <a:solidFill>
+                    <a:schemeClr val="tx1"/>
+                  </a:solidFill>
+                </a:ln>
+              </p:spPr>
+              <p:style>
+                <a:lnRef idx="1">
+                  <a:schemeClr val="accent1"/>
+                </a:lnRef>
+                <a:fillRef idx="0">
+                  <a:schemeClr val="accent1"/>
+                </a:fillRef>
+                <a:effectRef idx="0">
+                  <a:schemeClr val="accent1"/>
+                </a:effectRef>
+                <a:fontRef idx="minor">
+                  <a:schemeClr val="tx1"/>
+                </a:fontRef>
+              </p:style>
+            </p:cxnSp>
+          </p:grpSp>
+          <p:sp>
+            <p:nvSpPr>
+              <p:cNvPr id="17" name="TextBox 16">
+                <a:extLst>
+                  <a:ext uri="{FF2B5EF4-FFF2-40B4-BE49-F238E27FC236}">
+                    <a16:creationId xmlns:a16="http://schemas.microsoft.com/office/drawing/2014/main" id="{202ABB01-425A-894E-93E6-BDB6EE5F202C}"/>
+                  </a:ext>
+                </a:extLst>
+              </p:cNvPr>
+              <p:cNvSpPr txBox="1"/>
+              <p:nvPr/>
+            </p:nvSpPr>
+            <p:spPr>
+              <a:xfrm>
+                <a:off x="3023279" y="7009487"/>
+                <a:ext cx="3892585" cy="707886"/>
+              </a:xfrm>
+              <a:prstGeom prst="rect">
+                <a:avLst/>
+              </a:prstGeom>
+              <a:noFill/>
+            </p:spPr>
+            <p:txBody>
+              <a:bodyPr wrap="square" rtlCol="0">
+                <a:spAutoFit/>
+              </a:bodyPr>
+              <a:lstStyle/>
+              <a:p>
+                <a:r>
+                  <a:rPr lang="en-US" sz="4000" dirty="0"/>
+                  <a:t>Dense Obstacles</a:t>
+                </a:r>
+              </a:p>
+            </p:txBody>
+          </p:sp>
+        </p:grpSp>
+      </p:grpSp>
+      <p:sp>
+        <p:nvSpPr>
+          <p:cNvPr id="24" name="Rectangle 23">
+            <a:extLst>
+              <a:ext uri="{FF2B5EF4-FFF2-40B4-BE49-F238E27FC236}">
+                <a16:creationId xmlns:a16="http://schemas.microsoft.com/office/drawing/2014/main" id="{C5FF98CD-CE20-7C47-8E10-EE3BB84E0182}"/>
+              </a:ext>
+            </a:extLst>
+          </p:cNvPr>
+          <p:cNvSpPr/>
+          <p:nvPr/>
+        </p:nvSpPr>
+        <p:spPr>
+          <a:xfrm>
+            <a:off x="8211" y="12700"/>
+            <a:ext cx="8001000" cy="9171749"/>
+          </a:xfrm>
+          <a:prstGeom prst="rect">
+            <a:avLst/>
+          </a:prstGeom>
+          <a:noFill/>
+          <a:ln w="76200">
+            <a:solidFill>
+              <a:schemeClr val="tx2"/>
+            </a:solidFill>
+          </a:ln>
+        </p:spPr>
+        <p:style>
+          <a:lnRef idx="2">
+            <a:schemeClr val="accent1">
+              <a:shade val="50000"/>
+            </a:schemeClr>
+          </a:lnRef>
+          <a:fillRef idx="1">
+            <a:schemeClr val="accent1"/>
+          </a:fillRef>
+          <a:effectRef idx="0">
+            <a:schemeClr val="accent1"/>
+          </a:effectRef>
+          <a:fontRef idx="minor">
+            <a:schemeClr val="lt1"/>
+          </a:fontRef>
+        </p:style>
+        <p:txBody>
+          <a:bodyPr rtlCol="0" anchor="ctr"/>
+          <a:lstStyle/>
+          <a:p>
+            <a:pPr algn="ctr"/>
+            <a:endParaRPr lang="en-US" sz="9783"/>
+          </a:p>
+        </p:txBody>
+      </p:sp>
+      <p:sp>
+        <p:nvSpPr>
+          <p:cNvPr id="25" name="Rectangle 24">
+            <a:extLst>
+              <a:ext uri="{FF2B5EF4-FFF2-40B4-BE49-F238E27FC236}">
+                <a16:creationId xmlns:a16="http://schemas.microsoft.com/office/drawing/2014/main" id="{4005205C-D762-E840-BAE6-FCC4FB5C8BA2}"/>
+              </a:ext>
+            </a:extLst>
+          </p:cNvPr>
+          <p:cNvSpPr/>
+          <p:nvPr/>
+        </p:nvSpPr>
+        <p:spPr>
+          <a:xfrm>
+            <a:off x="8211" y="9177520"/>
+            <a:ext cx="8001000" cy="4501700"/>
+          </a:xfrm>
+          <a:prstGeom prst="rect">
+            <a:avLst/>
+          </a:prstGeom>
+          <a:noFill/>
+          <a:ln w="76200">
+            <a:solidFill>
+              <a:schemeClr val="tx2"/>
+            </a:solidFill>
+          </a:ln>
+        </p:spPr>
+        <p:style>
+          <a:lnRef idx="2">
+            <a:schemeClr val="accent1">
+              <a:shade val="50000"/>
+            </a:schemeClr>
+          </a:lnRef>
+          <a:fillRef idx="1">
+            <a:schemeClr val="accent1"/>
+          </a:fillRef>
+          <a:effectRef idx="0">
+            <a:schemeClr val="accent1"/>
+          </a:effectRef>
+          <a:fontRef idx="minor">
+            <a:schemeClr val="lt1"/>
+          </a:fontRef>
+        </p:style>
+        <p:txBody>
+          <a:bodyPr rtlCol="0" anchor="ctr"/>
+          <a:lstStyle/>
+          <a:p>
+            <a:pPr algn="ctr"/>
+            <a:endParaRPr lang="en-US" sz="9783"/>
+          </a:p>
+        </p:txBody>
+      </p:sp>
+      <p:sp>
+        <p:nvSpPr>
+          <p:cNvPr id="26" name="TextBox 25">
+            <a:extLst>
+              <a:ext uri="{FF2B5EF4-FFF2-40B4-BE49-F238E27FC236}">
+                <a16:creationId xmlns:a16="http://schemas.microsoft.com/office/drawing/2014/main" id="{4E0780A0-A7EC-C845-9856-A3564821FB31}"/>
+              </a:ext>
+            </a:extLst>
+          </p:cNvPr>
+          <p:cNvSpPr txBox="1"/>
+          <p:nvPr/>
+        </p:nvSpPr>
+        <p:spPr>
+          <a:xfrm>
+            <a:off x="403017" y="60278"/>
+            <a:ext cx="2928046" cy="738664"/>
+          </a:xfrm>
+          <a:prstGeom prst="rect">
+            <a:avLst/>
+          </a:prstGeom>
+          <a:noFill/>
+        </p:spPr>
+        <p:txBody>
+          <a:bodyPr wrap="none" rtlCol="0">
+            <a:spAutoFit/>
+          </a:bodyPr>
+          <a:lstStyle/>
+          <a:p>
+            <a:r>
+              <a:rPr lang="en-US" sz="4200" b="1" dirty="0"/>
+              <a:t>Map Legend</a:t>
+            </a:r>
+          </a:p>
+        </p:txBody>
+      </p:sp>
+      <p:grpSp>
+        <p:nvGrpSpPr>
+          <p:cNvPr id="15" name="Group 14">
+            <a:extLst>
+              <a:ext uri="{FF2B5EF4-FFF2-40B4-BE49-F238E27FC236}">
+                <a16:creationId xmlns:a16="http://schemas.microsoft.com/office/drawing/2014/main" id="{B81DDAB9-E14A-4B4B-89CD-14F1630E2133}"/>
+              </a:ext>
+            </a:extLst>
+          </p:cNvPr>
+          <p:cNvGrpSpPr/>
+          <p:nvPr/>
+        </p:nvGrpSpPr>
+        <p:grpSpPr>
+          <a:xfrm>
+            <a:off x="403017" y="13994695"/>
+            <a:ext cx="6871793" cy="6181981"/>
+            <a:chOff x="403017" y="13994695"/>
+            <a:chExt cx="6871793" cy="6181981"/>
+          </a:xfrm>
+        </p:grpSpPr>
+        <p:grpSp>
+          <p:nvGrpSpPr>
+            <p:cNvPr id="28" name="Group 27">
+              <a:extLst>
+                <a:ext uri="{FF2B5EF4-FFF2-40B4-BE49-F238E27FC236}">
+                  <a16:creationId xmlns:a16="http://schemas.microsoft.com/office/drawing/2014/main" id="{4E559C0C-901F-874C-89A9-10E702E67204}"/>
+                </a:ext>
+              </a:extLst>
+            </p:cNvPr>
+            <p:cNvGrpSpPr/>
+            <p:nvPr/>
+          </p:nvGrpSpPr>
+          <p:grpSpPr>
+            <a:xfrm>
+              <a:off x="403026" y="15048834"/>
+              <a:ext cx="5661823" cy="1323439"/>
+              <a:chOff x="403026" y="15801450"/>
+              <a:chExt cx="5661823" cy="1323439"/>
+            </a:xfrm>
+          </p:grpSpPr>
+          <p:sp>
+            <p:nvSpPr>
+              <p:cNvPr id="40" name="TextBox 39">
+                <a:extLst>
+                  <a:ext uri="{FF2B5EF4-FFF2-40B4-BE49-F238E27FC236}">
+                    <a16:creationId xmlns:a16="http://schemas.microsoft.com/office/drawing/2014/main" id="{6CDE2851-9997-6F49-B5AA-5438782D41A9}"/>
+                  </a:ext>
+                </a:extLst>
+              </p:cNvPr>
+              <p:cNvSpPr txBox="1"/>
+              <p:nvPr/>
+            </p:nvSpPr>
+            <p:spPr>
+              <a:xfrm>
+                <a:off x="3049408" y="15801450"/>
+                <a:ext cx="3015441" cy="1323439"/>
+              </a:xfrm>
+              <a:prstGeom prst="rect">
+                <a:avLst/>
+              </a:prstGeom>
+              <a:noFill/>
+            </p:spPr>
+            <p:txBody>
+              <a:bodyPr wrap="none" rtlCol="0">
+                <a:spAutoFit/>
+              </a:bodyPr>
+              <a:lstStyle/>
+              <a:p>
+                <a:r>
+                  <a:rPr lang="en-US" sz="4000" dirty="0"/>
+                  <a:t>Non-intrusive</a:t>
+                </a:r>
+              </a:p>
+              <a:p>
+                <a:r>
+                  <a:rPr lang="en-US" sz="4000" dirty="0"/>
+                  <a:t>(penalty = 0)</a:t>
+                </a:r>
+              </a:p>
+            </p:txBody>
+          </p:sp>
+          <p:grpSp>
+            <p:nvGrpSpPr>
+              <p:cNvPr id="41" name="Group 40">
+                <a:extLst>
+                  <a:ext uri="{FF2B5EF4-FFF2-40B4-BE49-F238E27FC236}">
+                    <a16:creationId xmlns:a16="http://schemas.microsoft.com/office/drawing/2014/main" id="{A4A081D4-12E2-D54F-BBC6-8DFFF42DE7C7}"/>
+                  </a:ext>
+                </a:extLst>
+              </p:cNvPr>
+              <p:cNvGrpSpPr/>
+              <p:nvPr/>
+            </p:nvGrpSpPr>
+            <p:grpSpPr>
+              <a:xfrm>
+                <a:off x="403026" y="16097410"/>
+                <a:ext cx="1981582" cy="731519"/>
+                <a:chOff x="403026" y="16830524"/>
+                <a:chExt cx="1981582" cy="731519"/>
+              </a:xfrm>
+            </p:grpSpPr>
+            <p:sp>
+              <p:nvSpPr>
+                <p:cNvPr id="42" name="Oval 41">
+                  <a:extLst>
+                    <a:ext uri="{FF2B5EF4-FFF2-40B4-BE49-F238E27FC236}">
+                      <a16:creationId xmlns:a16="http://schemas.microsoft.com/office/drawing/2014/main" id="{99F54A6D-44A7-914F-B89E-EC4772AAC3FA}"/>
+                    </a:ext>
+                  </a:extLst>
+                </p:cNvPr>
+                <p:cNvSpPr>
+                  <a:spLocks noChangeAspect="1"/>
+                </p:cNvSpPr>
+                <p:nvPr/>
+              </p:nvSpPr>
+              <p:spPr>
+                <a:xfrm>
+                  <a:off x="1653089" y="16830524"/>
+                  <a:ext cx="731519" cy="731519"/>
+                </a:xfrm>
+                <a:prstGeom prst="ellipse">
+                  <a:avLst/>
+                </a:prstGeom>
+                <a:solidFill>
+                  <a:srgbClr val="00B050"/>
+                </a:solidFill>
+                <a:ln>
+                  <a:solidFill>
+                    <a:schemeClr val="tx1"/>
+                  </a:solidFill>
+                </a:ln>
+              </p:spPr>
+              <p:style>
+                <a:lnRef idx="2">
+                  <a:schemeClr val="accent1">
+                    <a:shade val="50000"/>
+                  </a:schemeClr>
+                </a:lnRef>
+                <a:fillRef idx="1">
+                  <a:schemeClr val="accent1"/>
+                </a:fillRef>
+                <a:effectRef idx="0">
+                  <a:schemeClr val="accent1"/>
+                </a:effectRef>
+                <a:fontRef idx="minor">
+                  <a:schemeClr val="lt1"/>
+                </a:fontRef>
+              </p:style>
+              <p:txBody>
+                <a:bodyPr rtlCol="0" anchor="ctr"/>
+                <a:lstStyle/>
+                <a:p>
+                  <a:pPr algn="ctr"/>
+                  <a:endParaRPr lang="en-US" sz="9783" dirty="0"/>
+                </a:p>
+              </p:txBody>
+            </p:sp>
+            <p:cxnSp>
+              <p:nvCxnSpPr>
+                <p:cNvPr id="43" name="Straight Arrow Connector 42">
+                  <a:extLst>
+                    <a:ext uri="{FF2B5EF4-FFF2-40B4-BE49-F238E27FC236}">
+                      <a16:creationId xmlns:a16="http://schemas.microsoft.com/office/drawing/2014/main" id="{762CD341-AD56-AD45-9FE5-5FD0A7BAC1EA}"/>
+                    </a:ext>
+                  </a:extLst>
+                </p:cNvPr>
+                <p:cNvCxnSpPr>
+                  <a:cxnSpLocks/>
+                </p:cNvCxnSpPr>
+                <p:nvPr/>
+              </p:nvCxnSpPr>
+              <p:spPr>
+                <a:xfrm flipV="1">
+                  <a:off x="403026" y="17188483"/>
+                  <a:ext cx="1250063" cy="15600"/>
+                </a:xfrm>
+                <a:prstGeom prst="straightConnector1">
+                  <a:avLst/>
+                </a:prstGeom>
+                <a:ln w="57150">
+                  <a:solidFill>
+                    <a:schemeClr val="tx1"/>
+                  </a:solidFill>
+                  <a:headEnd type="none" w="med" len="med"/>
+                  <a:tailEnd type="arrow" w="med" len="med"/>
+                </a:ln>
+              </p:spPr>
+              <p:style>
+                <a:lnRef idx="1">
+                  <a:schemeClr val="accent1"/>
+                </a:lnRef>
+                <a:fillRef idx="0">
+                  <a:schemeClr val="accent1"/>
+                </a:fillRef>
+                <a:effectRef idx="0">
+                  <a:schemeClr val="accent1"/>
+                </a:effectRef>
+                <a:fontRef idx="minor">
+                  <a:schemeClr val="tx1"/>
+                </a:fontRef>
+              </p:style>
+            </p:cxnSp>
+          </p:grpSp>
+        </p:grpSp>
+        <p:grpSp>
+          <p:nvGrpSpPr>
+            <p:cNvPr id="29" name="Group 28">
+              <a:extLst>
+                <a:ext uri="{FF2B5EF4-FFF2-40B4-BE49-F238E27FC236}">
+                  <a16:creationId xmlns:a16="http://schemas.microsoft.com/office/drawing/2014/main" id="{D0C38E64-63CA-0A4E-987D-5B6002C73259}"/>
+                </a:ext>
+              </a:extLst>
+            </p:cNvPr>
+            <p:cNvGrpSpPr/>
+            <p:nvPr/>
+          </p:nvGrpSpPr>
+          <p:grpSpPr>
+            <a:xfrm>
+              <a:off x="403026" y="16944506"/>
+              <a:ext cx="6871784" cy="1323439"/>
+              <a:chOff x="403026" y="17522525"/>
+              <a:chExt cx="6871784" cy="1323439"/>
+            </a:xfrm>
+          </p:grpSpPr>
+          <p:sp>
+            <p:nvSpPr>
+              <p:cNvPr id="36" name="TextBox 35">
+                <a:extLst>
+                  <a:ext uri="{FF2B5EF4-FFF2-40B4-BE49-F238E27FC236}">
+                    <a16:creationId xmlns:a16="http://schemas.microsoft.com/office/drawing/2014/main" id="{39A2199B-841F-5D40-B0E8-6B6ED94C9391}"/>
+                  </a:ext>
+                </a:extLst>
+              </p:cNvPr>
+              <p:cNvSpPr txBox="1"/>
+              <p:nvPr/>
+            </p:nvSpPr>
+            <p:spPr>
+              <a:xfrm>
+                <a:off x="2955358" y="17522525"/>
+                <a:ext cx="4319452" cy="1323439"/>
+              </a:xfrm>
+              <a:prstGeom prst="rect">
+                <a:avLst/>
+              </a:prstGeom>
+              <a:noFill/>
+            </p:spPr>
+            <p:txBody>
+              <a:bodyPr wrap="none" rtlCol="0">
+                <a:spAutoFit/>
+              </a:bodyPr>
+              <a:lstStyle/>
+              <a:p>
+                <a:r>
+                  <a:rPr lang="en-US" sz="4000" dirty="0"/>
+                  <a:t>Somewhat intrusive</a:t>
+                </a:r>
+              </a:p>
+              <a:p>
+                <a:r>
+                  <a:rPr lang="en-US" sz="4000" dirty="0"/>
+                  <a:t>(penalty = 1)</a:t>
+                </a:r>
+              </a:p>
+            </p:txBody>
+          </p:sp>
+          <p:grpSp>
+            <p:nvGrpSpPr>
+              <p:cNvPr id="37" name="Group 36">
+                <a:extLst>
+                  <a:ext uri="{FF2B5EF4-FFF2-40B4-BE49-F238E27FC236}">
+                    <a16:creationId xmlns:a16="http://schemas.microsoft.com/office/drawing/2014/main" id="{6E2475EA-A0C9-B743-B257-D9E05757EA52}"/>
+                  </a:ext>
+                </a:extLst>
+              </p:cNvPr>
+              <p:cNvGrpSpPr/>
+              <p:nvPr/>
+            </p:nvGrpSpPr>
+            <p:grpSpPr>
+              <a:xfrm>
+                <a:off x="403026" y="17849440"/>
+                <a:ext cx="1981582" cy="731519"/>
+                <a:chOff x="403026" y="18390763"/>
+                <a:chExt cx="1981582" cy="731519"/>
+              </a:xfrm>
+            </p:grpSpPr>
+            <p:sp>
+              <p:nvSpPr>
+                <p:cNvPr id="38" name="Oval 37">
+                  <a:extLst>
+                    <a:ext uri="{FF2B5EF4-FFF2-40B4-BE49-F238E27FC236}">
+                      <a16:creationId xmlns:a16="http://schemas.microsoft.com/office/drawing/2014/main" id="{B638003D-58D1-4141-8420-B4CD1CC6E25A}"/>
+                    </a:ext>
+                  </a:extLst>
+                </p:cNvPr>
+                <p:cNvSpPr>
+                  <a:spLocks noChangeAspect="1"/>
+                </p:cNvSpPr>
+                <p:nvPr/>
+              </p:nvSpPr>
+              <p:spPr>
+                <a:xfrm>
+                  <a:off x="1653089" y="18390763"/>
+                  <a:ext cx="731519" cy="731519"/>
+                </a:xfrm>
+                <a:prstGeom prst="ellipse">
+                  <a:avLst/>
+                </a:prstGeom>
+                <a:solidFill>
+                  <a:srgbClr val="FFFF00"/>
+                </a:solidFill>
+                <a:ln>
+                  <a:solidFill>
+                    <a:schemeClr val="tx1"/>
+                  </a:solidFill>
+                </a:ln>
+              </p:spPr>
+              <p:style>
+                <a:lnRef idx="2">
+                  <a:schemeClr val="accent1">
+                    <a:shade val="50000"/>
+                  </a:schemeClr>
+                </a:lnRef>
+                <a:fillRef idx="1">
+                  <a:schemeClr val="accent1"/>
+                </a:fillRef>
+                <a:effectRef idx="0">
+                  <a:schemeClr val="accent1"/>
+                </a:effectRef>
+                <a:fontRef idx="minor">
+                  <a:schemeClr val="lt1"/>
+                </a:fontRef>
+              </p:style>
+              <p:txBody>
+                <a:bodyPr rtlCol="0" anchor="ctr"/>
+                <a:lstStyle/>
+                <a:p>
+                  <a:pPr algn="ctr"/>
+                  <a:endParaRPr lang="en-US" sz="9783"/>
+                </a:p>
+              </p:txBody>
+            </p:sp>
+            <p:cxnSp>
+              <p:nvCxnSpPr>
+                <p:cNvPr id="39" name="Straight Arrow Connector 38">
+                  <a:extLst>
+                    <a:ext uri="{FF2B5EF4-FFF2-40B4-BE49-F238E27FC236}">
+                      <a16:creationId xmlns:a16="http://schemas.microsoft.com/office/drawing/2014/main" id="{B960F67E-FD31-4D4F-B5BE-86B46DF86B25}"/>
+                    </a:ext>
+                  </a:extLst>
+                </p:cNvPr>
+                <p:cNvCxnSpPr>
+                  <a:cxnSpLocks/>
+                </p:cNvCxnSpPr>
+                <p:nvPr/>
+              </p:nvCxnSpPr>
+              <p:spPr>
+                <a:xfrm>
+                  <a:off x="403026" y="18756522"/>
+                  <a:ext cx="1250063" cy="0"/>
+                </a:xfrm>
+                <a:prstGeom prst="straightConnector1">
+                  <a:avLst/>
+                </a:prstGeom>
+                <a:ln w="57150">
+                  <a:solidFill>
+                    <a:schemeClr val="tx1"/>
+                  </a:solidFill>
+                  <a:headEnd type="none" w="med" len="med"/>
+                  <a:tailEnd type="arrow" w="med" len="med"/>
+                </a:ln>
+              </p:spPr>
+              <p:style>
+                <a:lnRef idx="1">
+                  <a:schemeClr val="accent1"/>
+                </a:lnRef>
+                <a:fillRef idx="0">
+                  <a:schemeClr val="accent1"/>
+                </a:fillRef>
+                <a:effectRef idx="0">
+                  <a:schemeClr val="accent1"/>
+                </a:effectRef>
+                <a:fontRef idx="minor">
+                  <a:schemeClr val="tx1"/>
+                </a:fontRef>
+              </p:style>
+            </p:cxnSp>
+          </p:grpSp>
+        </p:grpSp>
+        <p:grpSp>
+          <p:nvGrpSpPr>
+            <p:cNvPr id="30" name="Group 29">
+              <a:extLst>
+                <a:ext uri="{FF2B5EF4-FFF2-40B4-BE49-F238E27FC236}">
+                  <a16:creationId xmlns:a16="http://schemas.microsoft.com/office/drawing/2014/main" id="{04CA9435-797F-AB41-9673-3C43812F80B4}"/>
+                </a:ext>
+              </a:extLst>
+            </p:cNvPr>
+            <p:cNvGrpSpPr/>
+            <p:nvPr/>
+          </p:nvGrpSpPr>
+          <p:grpSpPr>
+            <a:xfrm>
+              <a:off x="403026" y="18853237"/>
+              <a:ext cx="5526367" cy="1323439"/>
+              <a:chOff x="403026" y="19305508"/>
+              <a:chExt cx="5526367" cy="1323439"/>
+            </a:xfrm>
+          </p:grpSpPr>
+          <p:sp>
+            <p:nvSpPr>
+              <p:cNvPr id="32" name="TextBox 31">
+                <a:extLst>
+                  <a:ext uri="{FF2B5EF4-FFF2-40B4-BE49-F238E27FC236}">
+                    <a16:creationId xmlns:a16="http://schemas.microsoft.com/office/drawing/2014/main" id="{D71CD979-16FE-C64F-8C1F-595F8154B15B}"/>
+                  </a:ext>
+                </a:extLst>
+              </p:cNvPr>
+              <p:cNvSpPr txBox="1"/>
+              <p:nvPr/>
+            </p:nvSpPr>
+            <p:spPr>
+              <a:xfrm>
+                <a:off x="2892087" y="19305508"/>
+                <a:ext cx="3037306" cy="1323439"/>
+              </a:xfrm>
+              <a:prstGeom prst="rect">
+                <a:avLst/>
+              </a:prstGeom>
+              <a:noFill/>
+            </p:spPr>
+            <p:txBody>
+              <a:bodyPr wrap="none" rtlCol="0">
+                <a:spAutoFit/>
+              </a:bodyPr>
+              <a:lstStyle/>
+              <a:p>
+                <a:r>
+                  <a:rPr lang="en-US" sz="4000" dirty="0"/>
+                  <a:t>Very intrusive</a:t>
+                </a:r>
+              </a:p>
+              <a:p>
+                <a:r>
+                  <a:rPr lang="en-US" sz="4000" dirty="0"/>
+                  <a:t>(penalty = 3)</a:t>
+                </a:r>
+              </a:p>
+            </p:txBody>
+          </p:sp>
+          <p:grpSp>
+            <p:nvGrpSpPr>
+              <p:cNvPr id="33" name="Group 32">
+                <a:extLst>
+                  <a:ext uri="{FF2B5EF4-FFF2-40B4-BE49-F238E27FC236}">
+                    <a16:creationId xmlns:a16="http://schemas.microsoft.com/office/drawing/2014/main" id="{5A48807C-7282-B34C-9410-2CDEC3641DAC}"/>
+                  </a:ext>
+                </a:extLst>
+              </p:cNvPr>
+              <p:cNvGrpSpPr/>
+              <p:nvPr/>
+            </p:nvGrpSpPr>
+            <p:grpSpPr>
+              <a:xfrm>
+                <a:off x="403026" y="19601469"/>
+                <a:ext cx="1981582" cy="731519"/>
+                <a:chOff x="403026" y="19951002"/>
+                <a:chExt cx="1981582" cy="731519"/>
+              </a:xfrm>
+            </p:grpSpPr>
+            <p:sp>
+              <p:nvSpPr>
+                <p:cNvPr id="34" name="Oval 33">
+                  <a:extLst>
+                    <a:ext uri="{FF2B5EF4-FFF2-40B4-BE49-F238E27FC236}">
+                      <a16:creationId xmlns:a16="http://schemas.microsoft.com/office/drawing/2014/main" id="{2DB80235-459C-8745-AC8E-C05BE30D5E3B}"/>
+                    </a:ext>
+                  </a:extLst>
+                </p:cNvPr>
+                <p:cNvSpPr>
+                  <a:spLocks noChangeAspect="1"/>
+                </p:cNvSpPr>
+                <p:nvPr/>
+              </p:nvSpPr>
+              <p:spPr>
+                <a:xfrm>
+                  <a:off x="1653089" y="19951002"/>
+                  <a:ext cx="731519" cy="731519"/>
+                </a:xfrm>
+                <a:prstGeom prst="ellipse">
+                  <a:avLst/>
+                </a:prstGeom>
+                <a:solidFill>
+                  <a:srgbClr val="FF0000"/>
+                </a:solidFill>
+                <a:ln>
+                  <a:solidFill>
+                    <a:schemeClr val="tx1"/>
+                  </a:solidFill>
+                </a:ln>
+              </p:spPr>
+              <p:style>
+                <a:lnRef idx="2">
+                  <a:schemeClr val="accent1">
+                    <a:shade val="50000"/>
+                  </a:schemeClr>
+                </a:lnRef>
+                <a:fillRef idx="1">
+                  <a:schemeClr val="accent1"/>
+                </a:fillRef>
+                <a:effectRef idx="0">
+                  <a:schemeClr val="accent1"/>
+                </a:effectRef>
+                <a:fontRef idx="minor">
+                  <a:schemeClr val="lt1"/>
+                </a:fontRef>
+              </p:style>
+              <p:txBody>
+                <a:bodyPr rtlCol="0" anchor="ctr"/>
+                <a:lstStyle/>
+                <a:p>
+                  <a:pPr algn="ctr"/>
+                  <a:endParaRPr lang="en-US" sz="9783"/>
+                </a:p>
+              </p:txBody>
+            </p:sp>
+            <p:cxnSp>
+              <p:nvCxnSpPr>
+                <p:cNvPr id="35" name="Straight Arrow Connector 34">
+                  <a:extLst>
+                    <a:ext uri="{FF2B5EF4-FFF2-40B4-BE49-F238E27FC236}">
+                      <a16:creationId xmlns:a16="http://schemas.microsoft.com/office/drawing/2014/main" id="{9EB6EB0E-1015-B04E-B4A5-9282A386CF4C}"/>
+                    </a:ext>
+                  </a:extLst>
+                </p:cNvPr>
+                <p:cNvCxnSpPr>
+                  <a:cxnSpLocks/>
+                </p:cNvCxnSpPr>
+                <p:nvPr/>
+              </p:nvCxnSpPr>
+              <p:spPr>
+                <a:xfrm>
+                  <a:off x="403026" y="20316761"/>
+                  <a:ext cx="1250063" cy="0"/>
+                </a:xfrm>
+                <a:prstGeom prst="straightConnector1">
+                  <a:avLst/>
+                </a:prstGeom>
+                <a:ln w="57150">
+                  <a:solidFill>
+                    <a:schemeClr val="tx1"/>
+                  </a:solidFill>
+                  <a:headEnd type="none" w="med" len="med"/>
+                  <a:tailEnd type="arrow" w="med" len="med"/>
+                </a:ln>
+              </p:spPr>
+              <p:style>
+                <a:lnRef idx="1">
+                  <a:schemeClr val="accent1"/>
+                </a:lnRef>
+                <a:fillRef idx="0">
+                  <a:schemeClr val="accent1"/>
+                </a:fillRef>
+                <a:effectRef idx="0">
+                  <a:schemeClr val="accent1"/>
+                </a:effectRef>
+                <a:fontRef idx="minor">
+                  <a:schemeClr val="tx1"/>
+                </a:fontRef>
+              </p:style>
+            </p:cxnSp>
+          </p:grpSp>
+        </p:grpSp>
+        <p:sp>
+          <p:nvSpPr>
+            <p:cNvPr id="31" name="TextBox 30">
+              <a:extLst>
+                <a:ext uri="{FF2B5EF4-FFF2-40B4-BE49-F238E27FC236}">
+                  <a16:creationId xmlns:a16="http://schemas.microsoft.com/office/drawing/2014/main" id="{9EA0350D-4615-C147-97A2-6A450BC54015}"/>
+                </a:ext>
+              </a:extLst>
+            </p:cNvPr>
+            <p:cNvSpPr txBox="1"/>
+            <p:nvPr/>
+          </p:nvSpPr>
+          <p:spPr>
+            <a:xfrm>
+              <a:off x="403017" y="13994695"/>
+              <a:ext cx="3135410" cy="738664"/>
+            </a:xfrm>
+            <a:prstGeom prst="rect">
+              <a:avLst/>
+            </a:prstGeom>
+            <a:noFill/>
+          </p:spPr>
+          <p:txBody>
+            <a:bodyPr wrap="none" rtlCol="0">
+              <a:spAutoFit/>
+            </a:bodyPr>
+            <a:lstStyle/>
+            <a:p>
+              <a:r>
+                <a:rPr lang="en-US" sz="4200" b="1" dirty="0"/>
+                <a:t>Intrusiveness</a:t>
+              </a:r>
+            </a:p>
+          </p:txBody>
+        </p:sp>
+      </p:grpSp>
+      <p:sp>
+        <p:nvSpPr>
+          <p:cNvPr id="45" name="TextBox 44">
+            <a:extLst>
+              <a:ext uri="{FF2B5EF4-FFF2-40B4-BE49-F238E27FC236}">
+                <a16:creationId xmlns:a16="http://schemas.microsoft.com/office/drawing/2014/main" id="{0A257381-736C-FF44-826B-7FD8CE112433}"/>
+              </a:ext>
+            </a:extLst>
+          </p:cNvPr>
+          <p:cNvSpPr txBox="1"/>
+          <p:nvPr/>
+        </p:nvSpPr>
+        <p:spPr>
+          <a:xfrm>
+            <a:off x="403017" y="9312833"/>
+            <a:ext cx="3275256" cy="738664"/>
+          </a:xfrm>
+          <a:prstGeom prst="rect">
+            <a:avLst/>
+          </a:prstGeom>
+          <a:noFill/>
+        </p:spPr>
+        <p:txBody>
+          <a:bodyPr wrap="none" rtlCol="0">
+            <a:spAutoFit/>
+          </a:bodyPr>
+          <a:lstStyle/>
+          <a:p>
+            <a:r>
+              <a:rPr lang="en-US" sz="4200" b="1" dirty="0"/>
+              <a:t>Driving Speed</a:t>
+            </a:r>
+          </a:p>
+        </p:txBody>
+      </p:sp>
+      <p:grpSp>
+        <p:nvGrpSpPr>
+          <p:cNvPr id="46" name="Group 45">
+            <a:extLst>
+              <a:ext uri="{FF2B5EF4-FFF2-40B4-BE49-F238E27FC236}">
+                <a16:creationId xmlns:a16="http://schemas.microsoft.com/office/drawing/2014/main" id="{D29D692A-C7F0-E547-BB43-5B089D19BE2F}"/>
+              </a:ext>
+            </a:extLst>
+          </p:cNvPr>
+          <p:cNvGrpSpPr/>
+          <p:nvPr/>
+        </p:nvGrpSpPr>
+        <p:grpSpPr>
+          <a:xfrm>
+            <a:off x="403017" y="10383446"/>
+            <a:ext cx="6871793" cy="1323439"/>
+            <a:chOff x="403017" y="12261608"/>
+            <a:chExt cx="6871793" cy="1323439"/>
+          </a:xfrm>
+        </p:grpSpPr>
+        <p:sp>
+          <p:nvSpPr>
+            <p:cNvPr id="50" name="TextBox 49">
+              <a:extLst>
+                <a:ext uri="{FF2B5EF4-FFF2-40B4-BE49-F238E27FC236}">
+                  <a16:creationId xmlns:a16="http://schemas.microsoft.com/office/drawing/2014/main" id="{1F66F07A-D7AA-034D-BE02-130AE241CF00}"/>
+                </a:ext>
+              </a:extLst>
+            </p:cNvPr>
+            <p:cNvSpPr txBox="1"/>
+            <p:nvPr/>
+          </p:nvSpPr>
+          <p:spPr>
+            <a:xfrm>
+              <a:off x="3052809" y="12261608"/>
+              <a:ext cx="4222001" cy="1323439"/>
+            </a:xfrm>
+            <a:prstGeom prst="rect">
+              <a:avLst/>
+            </a:prstGeom>
+            <a:noFill/>
+          </p:spPr>
+          <p:txBody>
+            <a:bodyPr wrap="square" rtlCol="0">
+              <a:spAutoFit/>
+            </a:bodyPr>
+            <a:lstStyle/>
+            <a:p>
+              <a:r>
+                <a:rPr lang="en-US" sz="4000" dirty="0"/>
+                <a:t>0.35 meter/second</a:t>
+              </a:r>
+              <a:br>
+                <a:rPr lang="en-US" sz="4000" dirty="0"/>
+              </a:br>
+              <a:r>
+                <a:rPr lang="en-US" sz="4000" dirty="0"/>
+                <a:t>(half speed)</a:t>
+              </a:r>
+            </a:p>
+          </p:txBody>
+        </p:sp>
+        <p:sp>
+          <p:nvSpPr>
+            <p:cNvPr id="51" name="Rectangle 50">
+              <a:extLst>
+                <a:ext uri="{FF2B5EF4-FFF2-40B4-BE49-F238E27FC236}">
+                  <a16:creationId xmlns:a16="http://schemas.microsoft.com/office/drawing/2014/main" id="{14273FBC-9EBA-934E-87BB-1FB0FBB5469D}"/>
+                </a:ext>
+              </a:extLst>
+            </p:cNvPr>
+            <p:cNvSpPr/>
+            <p:nvPr/>
+          </p:nvSpPr>
+          <p:spPr>
+            <a:xfrm>
+              <a:off x="403017" y="12524110"/>
+              <a:ext cx="2240280" cy="182880"/>
+            </a:xfrm>
+            <a:prstGeom prst="rect">
+              <a:avLst/>
+            </a:prstGeom>
+            <a:solidFill>
+              <a:srgbClr val="00B0F0"/>
+            </a:solidFill>
+            <a:ln>
+              <a:noFill/>
+            </a:ln>
+          </p:spPr>
+          <p:style>
+            <a:lnRef idx="2">
+              <a:schemeClr val="accent1">
+                <a:shade val="50000"/>
+              </a:schemeClr>
+            </a:lnRef>
+            <a:fillRef idx="1">
+              <a:schemeClr val="accent1"/>
+            </a:fillRef>
+            <a:effectRef idx="0">
+              <a:schemeClr val="accent1"/>
+            </a:effectRef>
+            <a:fontRef idx="minor">
+              <a:schemeClr val="lt1"/>
+            </a:fontRef>
+          </p:style>
+          <p:txBody>
+            <a:bodyPr rtlCol="0" anchor="ctr"/>
+            <a:lstStyle/>
+            <a:p>
+              <a:pPr algn="ctr"/>
+              <a:endParaRPr lang="en-US"/>
+            </a:p>
+          </p:txBody>
+        </p:sp>
+      </p:grpSp>
+      <p:grpSp>
+        <p:nvGrpSpPr>
+          <p:cNvPr id="47" name="Group 46">
+            <a:extLst>
+              <a:ext uri="{FF2B5EF4-FFF2-40B4-BE49-F238E27FC236}">
+                <a16:creationId xmlns:a16="http://schemas.microsoft.com/office/drawing/2014/main" id="{8C5648C7-25CD-9F41-8F9B-964DC46CA003}"/>
+              </a:ext>
+            </a:extLst>
+          </p:cNvPr>
+          <p:cNvGrpSpPr/>
+          <p:nvPr/>
+        </p:nvGrpSpPr>
+        <p:grpSpPr>
+          <a:xfrm>
+            <a:off x="403017" y="12063072"/>
+            <a:ext cx="6868392" cy="1323439"/>
+            <a:chOff x="403017" y="13535837"/>
+            <a:chExt cx="6868392" cy="1323439"/>
+          </a:xfrm>
+        </p:grpSpPr>
+        <p:sp>
+          <p:nvSpPr>
+            <p:cNvPr id="48" name="TextBox 47">
+              <a:extLst>
+                <a:ext uri="{FF2B5EF4-FFF2-40B4-BE49-F238E27FC236}">
+                  <a16:creationId xmlns:a16="http://schemas.microsoft.com/office/drawing/2014/main" id="{0B088811-3928-4149-B8C0-720E42C59161}"/>
+                </a:ext>
+              </a:extLst>
+            </p:cNvPr>
+            <p:cNvSpPr txBox="1"/>
+            <p:nvPr/>
+          </p:nvSpPr>
+          <p:spPr>
+            <a:xfrm>
+              <a:off x="3049408" y="13535837"/>
+              <a:ext cx="4222001" cy="1323439"/>
+            </a:xfrm>
+            <a:prstGeom prst="rect">
+              <a:avLst/>
+            </a:prstGeom>
+            <a:noFill/>
+          </p:spPr>
+          <p:txBody>
+            <a:bodyPr wrap="square" rtlCol="0">
+              <a:spAutoFit/>
+            </a:bodyPr>
+            <a:lstStyle/>
+            <a:p>
+              <a:r>
+                <a:rPr lang="en-US" sz="4000" dirty="0"/>
+                <a:t>0.7 meter/second</a:t>
+              </a:r>
+              <a:br>
+                <a:rPr lang="en-US" sz="4000" dirty="0"/>
+              </a:br>
+              <a:r>
+                <a:rPr lang="en-US" sz="4000" dirty="0"/>
+                <a:t>(full speed)</a:t>
+              </a:r>
+            </a:p>
+          </p:txBody>
+        </p:sp>
+        <p:sp>
+          <p:nvSpPr>
+            <p:cNvPr id="49" name="Rectangle 48">
+              <a:extLst>
+                <a:ext uri="{FF2B5EF4-FFF2-40B4-BE49-F238E27FC236}">
+                  <a16:creationId xmlns:a16="http://schemas.microsoft.com/office/drawing/2014/main" id="{8F6DA197-08E5-3844-A9AE-9176EDC41BAA}"/>
+                </a:ext>
+              </a:extLst>
+            </p:cNvPr>
+            <p:cNvSpPr/>
+            <p:nvPr/>
+          </p:nvSpPr>
+          <p:spPr>
+            <a:xfrm>
+              <a:off x="403017" y="13798340"/>
+              <a:ext cx="2240280" cy="182880"/>
+            </a:xfrm>
+            <a:prstGeom prst="rect">
+              <a:avLst/>
+            </a:prstGeom>
+            <a:solidFill>
+              <a:schemeClr val="accent1">
+                <a:lumMod val="75000"/>
+              </a:schemeClr>
+            </a:solidFill>
+            <a:ln>
+              <a:noFill/>
+            </a:ln>
+          </p:spPr>
+          <p:style>
+            <a:lnRef idx="2">
+              <a:schemeClr val="accent1">
+                <a:shade val="50000"/>
+              </a:schemeClr>
+            </a:lnRef>
+            <a:fillRef idx="1">
+              <a:schemeClr val="accent1"/>
+            </a:fillRef>
+            <a:effectRef idx="0">
+              <a:schemeClr val="accent1"/>
+            </a:effectRef>
+            <a:fontRef idx="minor">
+              <a:schemeClr val="lt1"/>
+            </a:fontRef>
+          </p:style>
+          <p:txBody>
+            <a:bodyPr rtlCol="0" anchor="ctr"/>
+            <a:lstStyle/>
+            <a:p>
+              <a:pPr algn="ctr"/>
+              <a:endParaRPr lang="en-US"/>
+            </a:p>
+          </p:txBody>
+        </p:sp>
+      </p:grpSp>
+      <p:grpSp>
+        <p:nvGrpSpPr>
+          <p:cNvPr id="13" name="Group 12">
+            <a:extLst>
+              <a:ext uri="{FF2B5EF4-FFF2-40B4-BE49-F238E27FC236}">
+                <a16:creationId xmlns:a16="http://schemas.microsoft.com/office/drawing/2014/main" id="{8D2A2BBD-8AEC-8641-BEE1-A86E367D2DCE}"/>
+              </a:ext>
+            </a:extLst>
+          </p:cNvPr>
+          <p:cNvGrpSpPr/>
+          <p:nvPr/>
+        </p:nvGrpSpPr>
+        <p:grpSpPr>
+          <a:xfrm>
+            <a:off x="390672" y="20889819"/>
+            <a:ext cx="7389479" cy="6957514"/>
+            <a:chOff x="390672" y="20889819"/>
+            <a:chExt cx="7389479" cy="6957514"/>
+          </a:xfrm>
+        </p:grpSpPr>
+        <p:sp>
+          <p:nvSpPr>
+            <p:cNvPr id="53" name="TextBox 52">
+              <a:extLst>
+                <a:ext uri="{FF2B5EF4-FFF2-40B4-BE49-F238E27FC236}">
+                  <a16:creationId xmlns:a16="http://schemas.microsoft.com/office/drawing/2014/main" id="{81A52688-96DB-2140-A808-A3F2EC0E9259}"/>
+                </a:ext>
+              </a:extLst>
+            </p:cNvPr>
+            <p:cNvSpPr txBox="1"/>
+            <p:nvPr/>
+          </p:nvSpPr>
+          <p:spPr>
+            <a:xfrm>
+              <a:off x="403017" y="20889819"/>
+              <a:ext cx="2085827" cy="738664"/>
+            </a:xfrm>
+            <a:prstGeom prst="rect">
+              <a:avLst/>
+            </a:prstGeom>
+            <a:noFill/>
+          </p:spPr>
+          <p:txBody>
+            <a:bodyPr wrap="none" rtlCol="0">
+              <a:spAutoFit/>
+            </a:bodyPr>
+            <a:lstStyle/>
+            <a:p>
+              <a:r>
+                <a:rPr lang="en-US" sz="4200" b="1" dirty="0"/>
+                <a:t>Collision</a:t>
+              </a:r>
+            </a:p>
+          </p:txBody>
+        </p:sp>
+        <p:grpSp>
+          <p:nvGrpSpPr>
+            <p:cNvPr id="54" name="Group 53">
+              <a:extLst>
+                <a:ext uri="{FF2B5EF4-FFF2-40B4-BE49-F238E27FC236}">
+                  <a16:creationId xmlns:a16="http://schemas.microsoft.com/office/drawing/2014/main" id="{5D98740F-F070-2B4E-8CCA-FB04BF7AA32C}"/>
+                </a:ext>
+              </a:extLst>
+            </p:cNvPr>
+            <p:cNvGrpSpPr/>
+            <p:nvPr/>
+          </p:nvGrpSpPr>
+          <p:grpSpPr>
+            <a:xfrm>
+              <a:off x="403017" y="22014085"/>
+              <a:ext cx="7377134" cy="1400767"/>
+              <a:chOff x="403017" y="22855622"/>
+              <a:chExt cx="7377134" cy="1400767"/>
+            </a:xfrm>
+          </p:grpSpPr>
+          <p:sp>
+            <p:nvSpPr>
+              <p:cNvPr id="65" name="TextBox 64">
+                <a:extLst>
+                  <a:ext uri="{FF2B5EF4-FFF2-40B4-BE49-F238E27FC236}">
+                    <a16:creationId xmlns:a16="http://schemas.microsoft.com/office/drawing/2014/main" id="{628BD2FA-8CEC-7A4A-AF2D-4B1214B392B7}"/>
+                  </a:ext>
+                </a:extLst>
+              </p:cNvPr>
+              <p:cNvSpPr txBox="1"/>
+              <p:nvPr/>
+            </p:nvSpPr>
+            <p:spPr>
+              <a:xfrm>
+                <a:off x="3040461" y="22932950"/>
+                <a:ext cx="4739690" cy="1323439"/>
+              </a:xfrm>
+              <a:prstGeom prst="rect">
+                <a:avLst/>
+              </a:prstGeom>
+              <a:noFill/>
+            </p:spPr>
+            <p:txBody>
+              <a:bodyPr wrap="square" rtlCol="0">
+                <a:spAutoFit/>
+              </a:bodyPr>
+              <a:lstStyle/>
+              <a:p>
+                <a:r>
+                  <a:rPr lang="en-US" sz="4000" dirty="0"/>
+                  <a:t>No collision</a:t>
+                </a:r>
+                <a:br>
+                  <a:rPr lang="en-US" sz="4000" dirty="0"/>
+                </a:br>
+                <a:r>
+                  <a:rPr lang="en-US" sz="4000" dirty="0"/>
+                  <a:t>at half speed</a:t>
+                </a:r>
+              </a:p>
+            </p:txBody>
+          </p:sp>
+          <p:grpSp>
+            <p:nvGrpSpPr>
+              <p:cNvPr id="66" name="Group 65">
+                <a:extLst>
+                  <a:ext uri="{FF2B5EF4-FFF2-40B4-BE49-F238E27FC236}">
+                    <a16:creationId xmlns:a16="http://schemas.microsoft.com/office/drawing/2014/main" id="{8473638E-3201-734A-90C1-262CF659953F}"/>
+                  </a:ext>
+                </a:extLst>
+              </p:cNvPr>
+              <p:cNvGrpSpPr/>
+              <p:nvPr/>
+            </p:nvGrpSpPr>
+            <p:grpSpPr>
+              <a:xfrm>
+                <a:off x="403017" y="22855622"/>
+                <a:ext cx="2240280" cy="862542"/>
+                <a:chOff x="403017" y="22882158"/>
+                <a:chExt cx="2240280" cy="862542"/>
+              </a:xfrm>
+            </p:grpSpPr>
+            <p:sp>
+              <p:nvSpPr>
+                <p:cNvPr id="67" name="TextBox 66">
+                  <a:extLst>
+                    <a:ext uri="{FF2B5EF4-FFF2-40B4-BE49-F238E27FC236}">
+                      <a16:creationId xmlns:a16="http://schemas.microsoft.com/office/drawing/2014/main" id="{CEC5C8CA-E51E-414A-BCAC-E7B7D8D2DC32}"/>
+                    </a:ext>
+                  </a:extLst>
+                </p:cNvPr>
+                <p:cNvSpPr txBox="1"/>
+                <p:nvPr/>
+              </p:nvSpPr>
+              <p:spPr>
+                <a:xfrm>
+                  <a:off x="1271326" y="22882158"/>
+                  <a:ext cx="503663" cy="862542"/>
+                </a:xfrm>
+                <a:prstGeom prst="rect">
+                  <a:avLst/>
+                </a:prstGeom>
+                <a:noFill/>
+              </p:spPr>
+              <p:txBody>
+                <a:bodyPr wrap="none" rtlCol="0">
+                  <a:spAutoFit/>
+                </a:bodyPr>
+                <a:lstStyle/>
+                <a:p>
+                  <a:r>
+                    <a:rPr lang="en-US" sz="5005" dirty="0"/>
+                    <a:t>*</a:t>
+                  </a:r>
+                </a:p>
+              </p:txBody>
+            </p:sp>
+            <p:sp>
+              <p:nvSpPr>
+                <p:cNvPr id="68" name="Rectangle 67">
+                  <a:extLst>
+                    <a:ext uri="{FF2B5EF4-FFF2-40B4-BE49-F238E27FC236}">
+                      <a16:creationId xmlns:a16="http://schemas.microsoft.com/office/drawing/2014/main" id="{7FA95D73-E07F-8549-957A-72DE31BC8A0B}"/>
+                    </a:ext>
+                  </a:extLst>
+                </p:cNvPr>
+                <p:cNvSpPr/>
+                <p:nvPr/>
+              </p:nvSpPr>
+              <p:spPr>
+                <a:xfrm>
+                  <a:off x="403017" y="23561820"/>
+                  <a:ext cx="2240280" cy="182880"/>
+                </a:xfrm>
+                <a:prstGeom prst="rect">
+                  <a:avLst/>
+                </a:prstGeom>
+                <a:solidFill>
+                  <a:srgbClr val="00B0F0"/>
+                </a:solidFill>
+                <a:ln>
+                  <a:noFill/>
+                </a:ln>
+              </p:spPr>
+              <p:style>
+                <a:lnRef idx="2">
+                  <a:schemeClr val="accent1">
+                    <a:shade val="50000"/>
+                  </a:schemeClr>
+                </a:lnRef>
+                <a:fillRef idx="1">
+                  <a:schemeClr val="accent1"/>
+                </a:fillRef>
+                <a:effectRef idx="0">
+                  <a:schemeClr val="accent1"/>
+                </a:effectRef>
+                <a:fontRef idx="minor">
+                  <a:schemeClr val="lt1"/>
+                </a:fontRef>
+              </p:style>
+              <p:txBody>
+                <a:bodyPr rtlCol="0" anchor="ctr"/>
+                <a:lstStyle/>
+                <a:p>
+                  <a:pPr algn="ctr"/>
+                  <a:endParaRPr lang="en-US"/>
+                </a:p>
+              </p:txBody>
+            </p:sp>
+          </p:grpSp>
+        </p:grpSp>
+        <p:grpSp>
+          <p:nvGrpSpPr>
+            <p:cNvPr id="55" name="Group 54">
+              <a:extLst>
+                <a:ext uri="{FF2B5EF4-FFF2-40B4-BE49-F238E27FC236}">
+                  <a16:creationId xmlns:a16="http://schemas.microsoft.com/office/drawing/2014/main" id="{F39C5275-0212-1B40-82E8-74F6A7C6E984}"/>
+                </a:ext>
+              </a:extLst>
+            </p:cNvPr>
+            <p:cNvGrpSpPr/>
+            <p:nvPr/>
+          </p:nvGrpSpPr>
+          <p:grpSpPr>
+            <a:xfrm>
+              <a:off x="390672" y="24169377"/>
+              <a:ext cx="7389478" cy="1463245"/>
+              <a:chOff x="390672" y="24523333"/>
+              <a:chExt cx="7389478" cy="1463245"/>
+            </a:xfrm>
+          </p:grpSpPr>
+          <p:sp>
+            <p:nvSpPr>
+              <p:cNvPr id="61" name="TextBox 60">
+                <a:extLst>
+                  <a:ext uri="{FF2B5EF4-FFF2-40B4-BE49-F238E27FC236}">
+                    <a16:creationId xmlns:a16="http://schemas.microsoft.com/office/drawing/2014/main" id="{D33CB192-7D28-354B-9726-61D347E5C8B6}"/>
+                  </a:ext>
+                </a:extLst>
+              </p:cNvPr>
+              <p:cNvSpPr txBox="1"/>
+              <p:nvPr/>
+            </p:nvSpPr>
+            <p:spPr>
+              <a:xfrm>
+                <a:off x="3052810" y="24663139"/>
+                <a:ext cx="4727340" cy="1323439"/>
+              </a:xfrm>
+              <a:prstGeom prst="rect">
+                <a:avLst/>
+              </a:prstGeom>
+              <a:noFill/>
+            </p:spPr>
+            <p:txBody>
+              <a:bodyPr wrap="square" rtlCol="0">
+                <a:spAutoFit/>
+              </a:bodyPr>
+              <a:lstStyle/>
+              <a:p>
+                <a:r>
+                  <a:rPr lang="en-US" sz="4000" dirty="0"/>
+                  <a:t>0.2 expected collision</a:t>
+                </a:r>
+                <a:br>
+                  <a:rPr lang="en-US" sz="4000" dirty="0"/>
+                </a:br>
+                <a:r>
+                  <a:rPr lang="en-US" sz="4000" dirty="0"/>
+                  <a:t>at full speed</a:t>
+                </a:r>
+              </a:p>
+            </p:txBody>
+          </p:sp>
+          <p:grpSp>
+            <p:nvGrpSpPr>
+              <p:cNvPr id="62" name="Group 61">
+                <a:extLst>
+                  <a:ext uri="{FF2B5EF4-FFF2-40B4-BE49-F238E27FC236}">
+                    <a16:creationId xmlns:a16="http://schemas.microsoft.com/office/drawing/2014/main" id="{BBEAB818-78EC-314E-BE48-6B60649E5C24}"/>
+                  </a:ext>
+                </a:extLst>
+              </p:cNvPr>
+              <p:cNvGrpSpPr/>
+              <p:nvPr/>
+            </p:nvGrpSpPr>
+            <p:grpSpPr>
+              <a:xfrm>
+                <a:off x="390672" y="24523333"/>
+                <a:ext cx="2240280" cy="987499"/>
+                <a:chOff x="390672" y="24523333"/>
+                <a:chExt cx="2240280" cy="987499"/>
+              </a:xfrm>
+            </p:grpSpPr>
+            <p:sp>
+              <p:nvSpPr>
+                <p:cNvPr id="63" name="TextBox 62">
+                  <a:extLst>
+                    <a:ext uri="{FF2B5EF4-FFF2-40B4-BE49-F238E27FC236}">
+                      <a16:creationId xmlns:a16="http://schemas.microsoft.com/office/drawing/2014/main" id="{93CD0281-CD1C-FF43-9450-2784D65FCE31}"/>
+                    </a:ext>
+                  </a:extLst>
+                </p:cNvPr>
+                <p:cNvSpPr txBox="1"/>
+                <p:nvPr/>
+              </p:nvSpPr>
+              <p:spPr>
+                <a:xfrm>
+                  <a:off x="1040170" y="24523333"/>
+                  <a:ext cx="904415" cy="862544"/>
+                </a:xfrm>
+                <a:prstGeom prst="rect">
+                  <a:avLst/>
+                </a:prstGeom>
+                <a:noFill/>
+              </p:spPr>
+              <p:txBody>
+                <a:bodyPr wrap="none" rtlCol="0">
+                  <a:spAutoFit/>
+                </a:bodyPr>
+                <a:lstStyle/>
+                <a:p>
+                  <a:r>
+                    <a:rPr lang="en-US" sz="5005" dirty="0"/>
+                    <a:t>SO</a:t>
+                  </a:r>
+                </a:p>
+              </p:txBody>
+            </p:sp>
+            <p:sp>
+              <p:nvSpPr>
+                <p:cNvPr id="64" name="Rectangle 63">
+                  <a:extLst>
+                    <a:ext uri="{FF2B5EF4-FFF2-40B4-BE49-F238E27FC236}">
+                      <a16:creationId xmlns:a16="http://schemas.microsoft.com/office/drawing/2014/main" id="{13CD0474-36A6-594F-B043-C905B8933C9C}"/>
+                    </a:ext>
+                  </a:extLst>
+                </p:cNvPr>
+                <p:cNvSpPr/>
+                <p:nvPr/>
+              </p:nvSpPr>
+              <p:spPr>
+                <a:xfrm>
+                  <a:off x="390672" y="25327952"/>
+                  <a:ext cx="2240280" cy="182880"/>
+                </a:xfrm>
+                <a:prstGeom prst="rect">
+                  <a:avLst/>
+                </a:prstGeom>
+                <a:solidFill>
+                  <a:schemeClr val="accent1">
+                    <a:lumMod val="75000"/>
+                  </a:schemeClr>
+                </a:solidFill>
+                <a:ln>
+                  <a:noFill/>
+                </a:ln>
+              </p:spPr>
+              <p:style>
+                <a:lnRef idx="2">
+                  <a:schemeClr val="accent1">
+                    <a:shade val="50000"/>
+                  </a:schemeClr>
+                </a:lnRef>
+                <a:fillRef idx="1">
+                  <a:schemeClr val="accent1"/>
+                </a:fillRef>
+                <a:effectRef idx="0">
+                  <a:schemeClr val="accent1"/>
+                </a:effectRef>
+                <a:fontRef idx="minor">
+                  <a:schemeClr val="lt1"/>
+                </a:fontRef>
+              </p:style>
+              <p:txBody>
+                <a:bodyPr rtlCol="0" anchor="ctr"/>
+                <a:lstStyle/>
+                <a:p>
+                  <a:pPr algn="ctr"/>
+                  <a:endParaRPr lang="en-US"/>
+                </a:p>
+              </p:txBody>
+            </p:sp>
+          </p:grpSp>
+        </p:grpSp>
+        <p:grpSp>
+          <p:nvGrpSpPr>
+            <p:cNvPr id="56" name="Group 55">
+              <a:extLst>
+                <a:ext uri="{FF2B5EF4-FFF2-40B4-BE49-F238E27FC236}">
+                  <a16:creationId xmlns:a16="http://schemas.microsoft.com/office/drawing/2014/main" id="{055ECE24-D7B7-F34A-AF05-51BB78C1A127}"/>
+                </a:ext>
+              </a:extLst>
+            </p:cNvPr>
+            <p:cNvGrpSpPr/>
+            <p:nvPr/>
+          </p:nvGrpSpPr>
+          <p:grpSpPr>
+            <a:xfrm>
+              <a:off x="390672" y="26384088"/>
+              <a:ext cx="7389479" cy="1463245"/>
+              <a:chOff x="390672" y="26074891"/>
+              <a:chExt cx="7389479" cy="1463245"/>
+            </a:xfrm>
+          </p:grpSpPr>
+          <p:sp>
+            <p:nvSpPr>
+              <p:cNvPr id="57" name="TextBox 56">
+                <a:extLst>
+                  <a:ext uri="{FF2B5EF4-FFF2-40B4-BE49-F238E27FC236}">
+                    <a16:creationId xmlns:a16="http://schemas.microsoft.com/office/drawing/2014/main" id="{4ABBDC04-B337-A740-95B0-A83E2CCE0589}"/>
+                  </a:ext>
+                </a:extLst>
+              </p:cNvPr>
+              <p:cNvSpPr txBox="1"/>
+              <p:nvPr/>
+            </p:nvSpPr>
+            <p:spPr>
+              <a:xfrm>
+                <a:off x="3040461" y="26214697"/>
+                <a:ext cx="4739690" cy="1323439"/>
+              </a:xfrm>
+              <a:prstGeom prst="rect">
+                <a:avLst/>
+              </a:prstGeom>
+              <a:noFill/>
+            </p:spPr>
+            <p:txBody>
+              <a:bodyPr wrap="square" rtlCol="0">
+                <a:spAutoFit/>
+              </a:bodyPr>
+              <a:lstStyle/>
+              <a:p>
+                <a:r>
+                  <a:rPr lang="en-US" sz="4000" dirty="0"/>
+                  <a:t>0.4 expected collision</a:t>
+                </a:r>
+                <a:br>
+                  <a:rPr lang="en-US" sz="4000" dirty="0"/>
+                </a:br>
+                <a:r>
+                  <a:rPr lang="en-US" sz="4000" dirty="0"/>
+                  <a:t>at full speed</a:t>
+                </a:r>
+              </a:p>
+            </p:txBody>
+          </p:sp>
+          <p:grpSp>
+            <p:nvGrpSpPr>
+              <p:cNvPr id="58" name="Group 57">
+                <a:extLst>
+                  <a:ext uri="{FF2B5EF4-FFF2-40B4-BE49-F238E27FC236}">
+                    <a16:creationId xmlns:a16="http://schemas.microsoft.com/office/drawing/2014/main" id="{A0D4F485-ED1D-5A48-B3A6-6A2FC57F1D18}"/>
+                  </a:ext>
+                </a:extLst>
+              </p:cNvPr>
+              <p:cNvGrpSpPr/>
+              <p:nvPr/>
+            </p:nvGrpSpPr>
+            <p:grpSpPr>
+              <a:xfrm>
+                <a:off x="390672" y="26074891"/>
+                <a:ext cx="2240280" cy="987499"/>
+                <a:chOff x="390672" y="24523333"/>
+                <a:chExt cx="2240280" cy="987499"/>
+              </a:xfrm>
+            </p:grpSpPr>
+            <p:sp>
+              <p:nvSpPr>
+                <p:cNvPr id="59" name="TextBox 58">
+                  <a:extLst>
+                    <a:ext uri="{FF2B5EF4-FFF2-40B4-BE49-F238E27FC236}">
+                      <a16:creationId xmlns:a16="http://schemas.microsoft.com/office/drawing/2014/main" id="{4A455F05-621E-B14B-AD29-E279F0FB280A}"/>
+                    </a:ext>
+                  </a:extLst>
+                </p:cNvPr>
+                <p:cNvSpPr txBox="1"/>
+                <p:nvPr/>
+              </p:nvSpPr>
+              <p:spPr>
+                <a:xfrm>
+                  <a:off x="1008912" y="24523333"/>
+                  <a:ext cx="1003801" cy="862544"/>
+                </a:xfrm>
+                <a:prstGeom prst="rect">
+                  <a:avLst/>
+                </a:prstGeom>
+                <a:noFill/>
+              </p:spPr>
+              <p:txBody>
+                <a:bodyPr wrap="none" rtlCol="0">
+                  <a:spAutoFit/>
+                </a:bodyPr>
+                <a:lstStyle/>
+                <a:p>
+                  <a:r>
+                    <a:rPr lang="en-US" sz="5005" dirty="0"/>
+                    <a:t>DO</a:t>
+                  </a:r>
+                </a:p>
+              </p:txBody>
+            </p:sp>
+            <p:sp>
+              <p:nvSpPr>
+                <p:cNvPr id="60" name="Rectangle 59">
+                  <a:extLst>
+                    <a:ext uri="{FF2B5EF4-FFF2-40B4-BE49-F238E27FC236}">
+                      <a16:creationId xmlns:a16="http://schemas.microsoft.com/office/drawing/2014/main" id="{06D9119C-5CFD-1947-974A-426A3A34C012}"/>
+                    </a:ext>
+                  </a:extLst>
+                </p:cNvPr>
+                <p:cNvSpPr/>
+                <p:nvPr/>
+              </p:nvSpPr>
+              <p:spPr>
+                <a:xfrm>
+                  <a:off x="390672" y="25327952"/>
+                  <a:ext cx="2240280" cy="182880"/>
+                </a:xfrm>
+                <a:prstGeom prst="rect">
+                  <a:avLst/>
+                </a:prstGeom>
+                <a:solidFill>
+                  <a:schemeClr val="accent1">
+                    <a:lumMod val="75000"/>
+                  </a:schemeClr>
+                </a:solidFill>
+                <a:ln>
+                  <a:noFill/>
+                </a:ln>
+              </p:spPr>
+              <p:style>
+                <a:lnRef idx="2">
+                  <a:schemeClr val="accent1">
+                    <a:shade val="50000"/>
+                  </a:schemeClr>
+                </a:lnRef>
+                <a:fillRef idx="1">
+                  <a:schemeClr val="accent1"/>
+                </a:fillRef>
+                <a:effectRef idx="0">
+                  <a:schemeClr val="accent1"/>
+                </a:effectRef>
+                <a:fontRef idx="minor">
+                  <a:schemeClr val="lt1"/>
+                </a:fontRef>
+              </p:style>
+              <p:txBody>
+                <a:bodyPr rtlCol="0" anchor="ctr"/>
+                <a:lstStyle/>
+                <a:p>
+                  <a:pPr algn="ctr"/>
+                  <a:endParaRPr lang="en-US"/>
+                </a:p>
+              </p:txBody>
+            </p:sp>
+          </p:grpSp>
+        </p:grpSp>
+      </p:grpSp>
+      <p:grpSp>
+        <p:nvGrpSpPr>
+          <p:cNvPr id="69" name="Group 68">
+            <a:extLst>
+              <a:ext uri="{FF2B5EF4-FFF2-40B4-BE49-F238E27FC236}">
+                <a16:creationId xmlns:a16="http://schemas.microsoft.com/office/drawing/2014/main" id="{A00FBF4F-4AB7-5F46-AEF8-A562E52AD64F}"/>
+              </a:ext>
+            </a:extLst>
+          </p:cNvPr>
+          <p:cNvGrpSpPr/>
+          <p:nvPr/>
+        </p:nvGrpSpPr>
+        <p:grpSpPr>
+          <a:xfrm>
+            <a:off x="1439909" y="7439447"/>
+            <a:ext cx="5159210" cy="1165105"/>
+            <a:chOff x="1326174" y="8383509"/>
+            <a:chExt cx="5159210" cy="1165105"/>
+          </a:xfrm>
+        </p:grpSpPr>
+        <p:sp>
+          <p:nvSpPr>
+            <p:cNvPr id="70" name="TextBox 69">
+              <a:extLst>
+                <a:ext uri="{FF2B5EF4-FFF2-40B4-BE49-F238E27FC236}">
+                  <a16:creationId xmlns:a16="http://schemas.microsoft.com/office/drawing/2014/main" id="{850CD981-D532-7F46-95A2-23C5F2966C89}"/>
+                </a:ext>
+              </a:extLst>
+            </p:cNvPr>
+            <p:cNvSpPr txBox="1"/>
+            <p:nvPr/>
+          </p:nvSpPr>
+          <p:spPr>
+            <a:xfrm>
+              <a:off x="2703879" y="8383509"/>
+              <a:ext cx="2403800" cy="707886"/>
+            </a:xfrm>
+            <a:prstGeom prst="rect">
+              <a:avLst/>
+            </a:prstGeom>
+            <a:noFill/>
+          </p:spPr>
+          <p:txBody>
+            <a:bodyPr wrap="none" rtlCol="0">
+              <a:spAutoFit/>
+            </a:bodyPr>
+            <a:lstStyle/>
+            <a:p>
+              <a:pPr algn="r"/>
+              <a:r>
+                <a:rPr lang="en-US" sz="4000" dirty="0"/>
+                <a:t>3.5 meters</a:t>
+              </a:r>
+            </a:p>
+          </p:txBody>
+        </p:sp>
+        <p:grpSp>
+          <p:nvGrpSpPr>
+            <p:cNvPr id="71" name="Group 70">
+              <a:extLst>
+                <a:ext uri="{FF2B5EF4-FFF2-40B4-BE49-F238E27FC236}">
+                  <a16:creationId xmlns:a16="http://schemas.microsoft.com/office/drawing/2014/main" id="{97CABE6B-5889-EA41-8EEC-B7A1B6845D76}"/>
+                </a:ext>
+              </a:extLst>
+            </p:cNvPr>
+            <p:cNvGrpSpPr/>
+            <p:nvPr/>
+          </p:nvGrpSpPr>
+          <p:grpSpPr>
+            <a:xfrm>
+              <a:off x="1326174" y="8634196"/>
+              <a:ext cx="5159210" cy="914418"/>
+              <a:chOff x="1750308" y="8249032"/>
+              <a:chExt cx="5159210" cy="914418"/>
+            </a:xfrm>
+          </p:grpSpPr>
+          <p:sp>
+            <p:nvSpPr>
+              <p:cNvPr id="72" name="Oval 71">
+                <a:extLst>
+                  <a:ext uri="{FF2B5EF4-FFF2-40B4-BE49-F238E27FC236}">
+                    <a16:creationId xmlns:a16="http://schemas.microsoft.com/office/drawing/2014/main" id="{C8A08697-21E6-8B44-81F8-4C355423EBCC}"/>
+                  </a:ext>
+                </a:extLst>
+              </p:cNvPr>
+              <p:cNvSpPr>
+                <a:spLocks noChangeAspect="1"/>
+              </p:cNvSpPr>
+              <p:nvPr/>
+            </p:nvSpPr>
+            <p:spPr>
+              <a:xfrm>
+                <a:off x="1750308" y="8249032"/>
+                <a:ext cx="914400" cy="914418"/>
+              </a:xfrm>
+              <a:prstGeom prst="ellipse">
+                <a:avLst/>
+              </a:prstGeom>
+              <a:solidFill>
+                <a:schemeClr val="bg2"/>
+              </a:solidFill>
+              <a:ln>
+                <a:solidFill>
+                  <a:schemeClr val="tx1"/>
+                </a:solidFill>
+              </a:ln>
+            </p:spPr>
+            <p:style>
+              <a:lnRef idx="2">
+                <a:schemeClr val="accent1">
+                  <a:shade val="50000"/>
+                </a:schemeClr>
+              </a:lnRef>
+              <a:fillRef idx="1">
+                <a:schemeClr val="accent1"/>
+              </a:fillRef>
+              <a:effectRef idx="0">
+                <a:schemeClr val="accent1"/>
+              </a:effectRef>
+              <a:fontRef idx="minor">
+                <a:schemeClr val="lt1"/>
+              </a:fontRef>
+            </p:style>
+            <p:txBody>
+              <a:bodyPr rtlCol="0" anchor="ctr"/>
+              <a:lstStyle/>
+              <a:p>
+                <a:pPr algn="ctr"/>
+                <a:r>
+                  <a:rPr lang="en-US" sz="3800" dirty="0">
+                    <a:solidFill>
+                      <a:schemeClr val="tx1"/>
+                    </a:solidFill>
+                  </a:rPr>
+                  <a:t>L1</a:t>
+                </a:r>
+              </a:p>
+            </p:txBody>
+          </p:sp>
+          <p:sp>
+            <p:nvSpPr>
+              <p:cNvPr id="73" name="Oval 72">
+                <a:extLst>
+                  <a:ext uri="{FF2B5EF4-FFF2-40B4-BE49-F238E27FC236}">
+                    <a16:creationId xmlns:a16="http://schemas.microsoft.com/office/drawing/2014/main" id="{704011A8-CD9F-0246-94EA-1030E122BFCD}"/>
+                  </a:ext>
+                </a:extLst>
+              </p:cNvPr>
+              <p:cNvSpPr>
+                <a:spLocks noChangeAspect="1"/>
+              </p:cNvSpPr>
+              <p:nvPr/>
+            </p:nvSpPr>
+            <p:spPr>
+              <a:xfrm>
+                <a:off x="5995136" y="8249032"/>
+                <a:ext cx="914382" cy="914400"/>
+              </a:xfrm>
+              <a:prstGeom prst="ellipse">
+                <a:avLst/>
+              </a:prstGeom>
+              <a:solidFill>
+                <a:schemeClr val="bg2"/>
+              </a:solidFill>
+              <a:ln>
+                <a:solidFill>
+                  <a:schemeClr val="tx1"/>
+                </a:solidFill>
+              </a:ln>
+            </p:spPr>
+            <p:style>
+              <a:lnRef idx="2">
+                <a:schemeClr val="accent1">
+                  <a:shade val="50000"/>
+                </a:schemeClr>
+              </a:lnRef>
+              <a:fillRef idx="1">
+                <a:schemeClr val="accent1"/>
+              </a:fillRef>
+              <a:effectRef idx="0">
+                <a:schemeClr val="accent1"/>
+              </a:effectRef>
+              <a:fontRef idx="minor">
+                <a:schemeClr val="lt1"/>
+              </a:fontRef>
+            </p:style>
+            <p:txBody>
+              <a:bodyPr rtlCol="0" anchor="ctr"/>
+              <a:lstStyle/>
+              <a:p>
+                <a:pPr algn="ctr"/>
+                <a:r>
+                  <a:rPr lang="en-US" sz="3800" dirty="0">
+                    <a:solidFill>
+                      <a:schemeClr val="tx1"/>
+                    </a:solidFill>
+                  </a:rPr>
+                  <a:t>L2</a:t>
+                </a:r>
+              </a:p>
+            </p:txBody>
+          </p:sp>
+          <p:cxnSp>
+            <p:nvCxnSpPr>
+              <p:cNvPr id="74" name="Straight Connector 73">
+                <a:extLst>
+                  <a:ext uri="{FF2B5EF4-FFF2-40B4-BE49-F238E27FC236}">
+                    <a16:creationId xmlns:a16="http://schemas.microsoft.com/office/drawing/2014/main" id="{6C48639A-E77F-A047-933C-075F75243B92}"/>
+                  </a:ext>
+                </a:extLst>
+              </p:cNvPr>
+              <p:cNvCxnSpPr>
+                <a:stCxn id="72" idx="6"/>
+                <a:endCxn id="73" idx="2"/>
+              </p:cNvCxnSpPr>
+              <p:nvPr/>
+            </p:nvCxnSpPr>
+            <p:spPr>
+              <a:xfrm flipV="1">
+                <a:off x="2664708" y="8706232"/>
+                <a:ext cx="3330428" cy="9"/>
+              </a:xfrm>
+              <a:prstGeom prst="line">
+                <a:avLst/>
+              </a:prstGeom>
+              <a:ln w="38100">
+                <a:solidFill>
+                  <a:schemeClr val="tx1"/>
+                </a:solidFill>
+              </a:ln>
+            </p:spPr>
+            <p:style>
+              <a:lnRef idx="1">
+                <a:schemeClr val="accent1"/>
+              </a:lnRef>
+              <a:fillRef idx="0">
+                <a:schemeClr val="accent1"/>
+              </a:fillRef>
+              <a:effectRef idx="0">
+                <a:schemeClr val="accent1"/>
+              </a:effectRef>
+              <a:fontRef idx="minor">
+                <a:schemeClr val="tx1"/>
+              </a:fontRef>
+            </p:style>
+          </p:cxnSp>
+        </p:grpSp>
+      </p:grpSp>
+    </p:spTree>
+    <p:extLst>
+      <p:ext uri="{BB962C8B-B14F-4D97-AF65-F5344CB8AC3E}">
+        <p14:creationId xmlns:p14="http://schemas.microsoft.com/office/powerpoint/2010/main" val="1452574905"/>
+      </p:ext>
+    </p:extLst>
+  </p:cSld>
+  <p:clrMapOvr>
+    <a:masterClrMapping/>
+  </p:clrMapOvr>
+</p:sld>
+</file>
+
 <file path=ppt/theme/theme1.xml><?xml version="1.0" encoding="utf-8"?>
 <a:theme xmlns:a="http://schemas.openxmlformats.org/drawingml/2006/main" name="Office Theme">
   <a:themeElements>

</xml_diff>